<commit_message>
doc/: [fix] arrow position in presentation .pdf
</commit_message>
<xml_diff>
--- a/doc/search_for_exoplanets(proposal presentation).pptx
+++ b/doc/search_for_exoplanets(proposal presentation).pptx
@@ -12,7 +12,7 @@
     <p:sldId id="259" r:id="rId7"/>
   </p:sldIdLst>
   <p:sldSz cx="9144000" cy="5143500"/>
-  <p:notesSz cx="6858000" cy="9144000"/>
+  <p:notesSz cx="7559675" cy="10691812"/>
 </p:presentation>
 </file>
 
@@ -57,7 +57,7 @@
       </p:grpSpPr>
       <p:sp>
         <p:nvSpPr>
-          <p:cNvPr id="24" name="PlaceHolder 1"/>
+          <p:cNvPr id="23" name="PlaceHolder 1"/>
           <p:cNvSpPr>
             <a:spLocks noGrp="1"/>
           </p:cNvSpPr>
@@ -67,8 +67,8 @@
         </p:nvSpPr>
         <p:spPr>
           <a:xfrm>
-            <a:off x="311760" y="444960"/>
-            <a:ext cx="8520120" cy="572400"/>
+            <a:off x="311760" y="418320"/>
+            <a:ext cx="8519760" cy="625320"/>
           </a:xfrm>
           <a:prstGeom prst="rect">
             <a:avLst/>
@@ -77,23 +77,24 @@
         <p:txBody>
           <a:bodyPr lIns="0" rIns="0" tIns="0" bIns="0" anchor="ctr"/>
           <a:p>
-            <a:endParaRPr b="0" lang="en-US" sz="1400" spc="-1" strike="noStrike">
-              <a:solidFill>
-                <a:srgbClr val="000000"/>
-              </a:solidFill>
-              <a:uFill>
-                <a:solidFill>
-                  <a:srgbClr val="ffffff"/>
-                </a:solidFill>
-              </a:uFill>
-              <a:latin typeface="Arial"/>
-            </a:endParaRPr>
-          </a:p>
-        </p:txBody>
-      </p:sp>
-      <p:sp>
-        <p:nvSpPr>
-          <p:cNvPr id="25" name="PlaceHolder 2"/>
+            <a:pPr algn="ctr"/>
+            <a:endParaRPr b="0" lang="en-US" sz="4400" spc="-1" strike="noStrike">
+              <a:solidFill>
+                <a:srgbClr val="ffffff"/>
+              </a:solidFill>
+              <a:uFill>
+                <a:solidFill>
+                  <a:srgbClr val="ffffff"/>
+                </a:solidFill>
+              </a:uFill>
+              <a:latin typeface="Arial"/>
+            </a:endParaRPr>
+          </a:p>
+        </p:txBody>
+      </p:sp>
+      <p:sp>
+        <p:nvSpPr>
+          <p:cNvPr id="24" name="PlaceHolder 2"/>
           <p:cNvSpPr>
             <a:spLocks noGrp="1"/>
           </p:cNvSpPr>
@@ -104,7 +105,7 @@
         <p:spPr>
           <a:xfrm>
             <a:off x="311760" y="1152360"/>
-            <a:ext cx="8520120" cy="1629360"/>
+            <a:ext cx="8519760" cy="1629000"/>
           </a:xfrm>
           <a:prstGeom prst="rect">
             <a:avLst/>
@@ -113,23 +114,23 @@
         <p:txBody>
           <a:bodyPr lIns="0" rIns="0" tIns="0" bIns="0"/>
           <a:p>
-            <a:endParaRPr b="0" lang="en-US" sz="1400" spc="-1" strike="noStrike">
-              <a:solidFill>
-                <a:srgbClr val="000000"/>
-              </a:solidFill>
-              <a:uFill>
-                <a:solidFill>
-                  <a:srgbClr val="ffffff"/>
-                </a:solidFill>
-              </a:uFill>
-              <a:latin typeface="Arial"/>
-            </a:endParaRPr>
-          </a:p>
-        </p:txBody>
-      </p:sp>
-      <p:sp>
-        <p:nvSpPr>
-          <p:cNvPr id="26" name="PlaceHolder 3"/>
+            <a:endParaRPr b="0" lang="en-US" sz="3200" spc="-1" strike="noStrike">
+              <a:solidFill>
+                <a:srgbClr val="ffffff"/>
+              </a:solidFill>
+              <a:uFill>
+                <a:solidFill>
+                  <a:srgbClr val="ffffff"/>
+                </a:solidFill>
+              </a:uFill>
+              <a:latin typeface="Arial"/>
+            </a:endParaRPr>
+          </a:p>
+        </p:txBody>
+      </p:sp>
+      <p:sp>
+        <p:nvSpPr>
+          <p:cNvPr id="25" name="PlaceHolder 3"/>
           <p:cNvSpPr>
             <a:spLocks noGrp="1"/>
           </p:cNvSpPr>
@@ -139,8 +140,8 @@
         </p:nvSpPr>
         <p:spPr>
           <a:xfrm>
-            <a:off x="311760" y="2936880"/>
-            <a:ext cx="8520120" cy="1629360"/>
+            <a:off x="311760" y="2936520"/>
+            <a:ext cx="8519760" cy="1629000"/>
           </a:xfrm>
           <a:prstGeom prst="rect">
             <a:avLst/>
@@ -149,9 +150,9 @@
         <p:txBody>
           <a:bodyPr lIns="0" rIns="0" tIns="0" bIns="0"/>
           <a:p>
-            <a:endParaRPr b="0" lang="en-US" sz="1400" spc="-1" strike="noStrike">
-              <a:solidFill>
-                <a:srgbClr val="000000"/>
+            <a:endParaRPr b="0" lang="en-US" sz="3200" spc="-1" strike="noStrike">
+              <a:solidFill>
+                <a:srgbClr val="ffffff"/>
               </a:solidFill>
               <a:uFill>
                 <a:solidFill>
@@ -187,7 +188,7 @@
       </p:grpSpPr>
       <p:sp>
         <p:nvSpPr>
-          <p:cNvPr id="27" name="PlaceHolder 1"/>
+          <p:cNvPr id="26" name="PlaceHolder 1"/>
           <p:cNvSpPr>
             <a:spLocks noGrp="1"/>
           </p:cNvSpPr>
@@ -197,8 +198,8 @@
         </p:nvSpPr>
         <p:spPr>
           <a:xfrm>
-            <a:off x="311760" y="444960"/>
-            <a:ext cx="8520120" cy="572400"/>
+            <a:off x="311760" y="418320"/>
+            <a:ext cx="8519760" cy="625320"/>
           </a:xfrm>
           <a:prstGeom prst="rect">
             <a:avLst/>
@@ -207,23 +208,24 @@
         <p:txBody>
           <a:bodyPr lIns="0" rIns="0" tIns="0" bIns="0" anchor="ctr"/>
           <a:p>
-            <a:endParaRPr b="0" lang="en-US" sz="1400" spc="-1" strike="noStrike">
-              <a:solidFill>
-                <a:srgbClr val="000000"/>
-              </a:solidFill>
-              <a:uFill>
-                <a:solidFill>
-                  <a:srgbClr val="ffffff"/>
-                </a:solidFill>
-              </a:uFill>
-              <a:latin typeface="Arial"/>
-            </a:endParaRPr>
-          </a:p>
-        </p:txBody>
-      </p:sp>
-      <p:sp>
-        <p:nvSpPr>
-          <p:cNvPr id="28" name="PlaceHolder 2"/>
+            <a:pPr algn="ctr"/>
+            <a:endParaRPr b="0" lang="en-US" sz="4400" spc="-1" strike="noStrike">
+              <a:solidFill>
+                <a:srgbClr val="ffffff"/>
+              </a:solidFill>
+              <a:uFill>
+                <a:solidFill>
+                  <a:srgbClr val="ffffff"/>
+                </a:solidFill>
+              </a:uFill>
+              <a:latin typeface="Arial"/>
+            </a:endParaRPr>
+          </a:p>
+        </p:txBody>
+      </p:sp>
+      <p:sp>
+        <p:nvSpPr>
+          <p:cNvPr id="27" name="PlaceHolder 2"/>
           <p:cNvSpPr>
             <a:spLocks noGrp="1"/>
           </p:cNvSpPr>
@@ -234,7 +236,7 @@
         <p:spPr>
           <a:xfrm>
             <a:off x="311760" y="1152360"/>
-            <a:ext cx="4157640" cy="1629360"/>
+            <a:ext cx="4157280" cy="1629000"/>
           </a:xfrm>
           <a:prstGeom prst="rect">
             <a:avLst/>
@@ -243,23 +245,23 @@
         <p:txBody>
           <a:bodyPr lIns="0" rIns="0" tIns="0" bIns="0"/>
           <a:p>
-            <a:endParaRPr b="0" lang="en-US" sz="1400" spc="-1" strike="noStrike">
-              <a:solidFill>
-                <a:srgbClr val="000000"/>
-              </a:solidFill>
-              <a:uFill>
-                <a:solidFill>
-                  <a:srgbClr val="ffffff"/>
-                </a:solidFill>
-              </a:uFill>
-              <a:latin typeface="Arial"/>
-            </a:endParaRPr>
-          </a:p>
-        </p:txBody>
-      </p:sp>
-      <p:sp>
-        <p:nvSpPr>
-          <p:cNvPr id="29" name="PlaceHolder 3"/>
+            <a:endParaRPr b="0" lang="en-US" sz="3200" spc="-1" strike="noStrike">
+              <a:solidFill>
+                <a:srgbClr val="ffffff"/>
+              </a:solidFill>
+              <a:uFill>
+                <a:solidFill>
+                  <a:srgbClr val="ffffff"/>
+                </a:solidFill>
+              </a:uFill>
+              <a:latin typeface="Arial"/>
+            </a:endParaRPr>
+          </a:p>
+        </p:txBody>
+      </p:sp>
+      <p:sp>
+        <p:nvSpPr>
+          <p:cNvPr id="28" name="PlaceHolder 3"/>
           <p:cNvSpPr>
             <a:spLocks noGrp="1"/>
           </p:cNvSpPr>
@@ -269,8 +271,8 @@
         </p:nvSpPr>
         <p:spPr>
           <a:xfrm>
-            <a:off x="4677840" y="1152360"/>
-            <a:ext cx="4157640" cy="1629360"/>
+            <a:off x="4677120" y="1152360"/>
+            <a:ext cx="4157280" cy="1629000"/>
           </a:xfrm>
           <a:prstGeom prst="rect">
             <a:avLst/>
@@ -279,23 +281,23 @@
         <p:txBody>
           <a:bodyPr lIns="0" rIns="0" tIns="0" bIns="0"/>
           <a:p>
-            <a:endParaRPr b="0" lang="en-US" sz="1400" spc="-1" strike="noStrike">
-              <a:solidFill>
-                <a:srgbClr val="000000"/>
-              </a:solidFill>
-              <a:uFill>
-                <a:solidFill>
-                  <a:srgbClr val="ffffff"/>
-                </a:solidFill>
-              </a:uFill>
-              <a:latin typeface="Arial"/>
-            </a:endParaRPr>
-          </a:p>
-        </p:txBody>
-      </p:sp>
-      <p:sp>
-        <p:nvSpPr>
-          <p:cNvPr id="30" name="PlaceHolder 4"/>
+            <a:endParaRPr b="0" lang="en-US" sz="3200" spc="-1" strike="noStrike">
+              <a:solidFill>
+                <a:srgbClr val="ffffff"/>
+              </a:solidFill>
+              <a:uFill>
+                <a:solidFill>
+                  <a:srgbClr val="ffffff"/>
+                </a:solidFill>
+              </a:uFill>
+              <a:latin typeface="Arial"/>
+            </a:endParaRPr>
+          </a:p>
+        </p:txBody>
+      </p:sp>
+      <p:sp>
+        <p:nvSpPr>
+          <p:cNvPr id="29" name="PlaceHolder 4"/>
           <p:cNvSpPr>
             <a:spLocks noGrp="1"/>
           </p:cNvSpPr>
@@ -305,8 +307,8 @@
         </p:nvSpPr>
         <p:spPr>
           <a:xfrm>
-            <a:off x="4677840" y="2936880"/>
-            <a:ext cx="4157640" cy="1629360"/>
+            <a:off x="4677120" y="2936520"/>
+            <a:ext cx="4157280" cy="1629000"/>
           </a:xfrm>
           <a:prstGeom prst="rect">
             <a:avLst/>
@@ -315,23 +317,23 @@
         <p:txBody>
           <a:bodyPr lIns="0" rIns="0" tIns="0" bIns="0"/>
           <a:p>
-            <a:endParaRPr b="0" lang="en-US" sz="1400" spc="-1" strike="noStrike">
-              <a:solidFill>
-                <a:srgbClr val="000000"/>
-              </a:solidFill>
-              <a:uFill>
-                <a:solidFill>
-                  <a:srgbClr val="ffffff"/>
-                </a:solidFill>
-              </a:uFill>
-              <a:latin typeface="Arial"/>
-            </a:endParaRPr>
-          </a:p>
-        </p:txBody>
-      </p:sp>
-      <p:sp>
-        <p:nvSpPr>
-          <p:cNvPr id="31" name="PlaceHolder 5"/>
+            <a:endParaRPr b="0" lang="en-US" sz="3200" spc="-1" strike="noStrike">
+              <a:solidFill>
+                <a:srgbClr val="ffffff"/>
+              </a:solidFill>
+              <a:uFill>
+                <a:solidFill>
+                  <a:srgbClr val="ffffff"/>
+                </a:solidFill>
+              </a:uFill>
+              <a:latin typeface="Arial"/>
+            </a:endParaRPr>
+          </a:p>
+        </p:txBody>
+      </p:sp>
+      <p:sp>
+        <p:nvSpPr>
+          <p:cNvPr id="30" name="PlaceHolder 5"/>
           <p:cNvSpPr>
             <a:spLocks noGrp="1"/>
           </p:cNvSpPr>
@@ -341,8 +343,8 @@
         </p:nvSpPr>
         <p:spPr>
           <a:xfrm>
-            <a:off x="311760" y="2936880"/>
-            <a:ext cx="4157640" cy="1629360"/>
+            <a:off x="311760" y="2936520"/>
+            <a:ext cx="4157280" cy="1629000"/>
           </a:xfrm>
           <a:prstGeom prst="rect">
             <a:avLst/>
@@ -351,9 +353,9 @@
         <p:txBody>
           <a:bodyPr lIns="0" rIns="0" tIns="0" bIns="0"/>
           <a:p>
-            <a:endParaRPr b="0" lang="en-US" sz="1400" spc="-1" strike="noStrike">
-              <a:solidFill>
-                <a:srgbClr val="000000"/>
+            <a:endParaRPr b="0" lang="en-US" sz="3200" spc="-1" strike="noStrike">
+              <a:solidFill>
+                <a:srgbClr val="ffffff"/>
               </a:solidFill>
               <a:uFill>
                 <a:solidFill>
@@ -389,7 +391,7 @@
       </p:grpSpPr>
       <p:sp>
         <p:nvSpPr>
-          <p:cNvPr id="32" name="PlaceHolder 1"/>
+          <p:cNvPr id="31" name="PlaceHolder 1"/>
           <p:cNvSpPr>
             <a:spLocks noGrp="1"/>
           </p:cNvSpPr>
@@ -399,8 +401,8 @@
         </p:nvSpPr>
         <p:spPr>
           <a:xfrm>
-            <a:off x="311760" y="444960"/>
-            <a:ext cx="8520120" cy="572400"/>
+            <a:off x="311760" y="418320"/>
+            <a:ext cx="8519760" cy="625320"/>
           </a:xfrm>
           <a:prstGeom prst="rect">
             <a:avLst/>
@@ -409,23 +411,24 @@
         <p:txBody>
           <a:bodyPr lIns="0" rIns="0" tIns="0" bIns="0" anchor="ctr"/>
           <a:p>
-            <a:endParaRPr b="0" lang="en-US" sz="1400" spc="-1" strike="noStrike">
-              <a:solidFill>
-                <a:srgbClr val="000000"/>
-              </a:solidFill>
-              <a:uFill>
-                <a:solidFill>
-                  <a:srgbClr val="ffffff"/>
-                </a:solidFill>
-              </a:uFill>
-              <a:latin typeface="Arial"/>
-            </a:endParaRPr>
-          </a:p>
-        </p:txBody>
-      </p:sp>
-      <p:sp>
-        <p:nvSpPr>
-          <p:cNvPr id="33" name="PlaceHolder 2"/>
+            <a:pPr algn="ctr"/>
+            <a:endParaRPr b="0" lang="en-US" sz="4400" spc="-1" strike="noStrike">
+              <a:solidFill>
+                <a:srgbClr val="ffffff"/>
+              </a:solidFill>
+              <a:uFill>
+                <a:solidFill>
+                  <a:srgbClr val="ffffff"/>
+                </a:solidFill>
+              </a:uFill>
+              <a:latin typeface="Arial"/>
+            </a:endParaRPr>
+          </a:p>
+        </p:txBody>
+      </p:sp>
+      <p:sp>
+        <p:nvSpPr>
+          <p:cNvPr id="32" name="PlaceHolder 2"/>
           <p:cNvSpPr>
             <a:spLocks noGrp="1"/>
           </p:cNvSpPr>
@@ -436,7 +439,7 @@
         <p:spPr>
           <a:xfrm>
             <a:off x="311760" y="1152360"/>
-            <a:ext cx="8520120" cy="3416040"/>
+            <a:ext cx="8519760" cy="3415680"/>
           </a:xfrm>
           <a:prstGeom prst="rect">
             <a:avLst/>
@@ -445,23 +448,23 @@
         <p:txBody>
           <a:bodyPr lIns="0" rIns="0" tIns="0" bIns="0"/>
           <a:p>
-            <a:endParaRPr b="0" lang="en-US" sz="1400" spc="-1" strike="noStrike">
-              <a:solidFill>
-                <a:srgbClr val="000000"/>
-              </a:solidFill>
-              <a:uFill>
-                <a:solidFill>
-                  <a:srgbClr val="ffffff"/>
-                </a:solidFill>
-              </a:uFill>
-              <a:latin typeface="Arial"/>
-            </a:endParaRPr>
-          </a:p>
-        </p:txBody>
-      </p:sp>
-      <p:sp>
-        <p:nvSpPr>
-          <p:cNvPr id="34" name="PlaceHolder 3"/>
+            <a:endParaRPr b="0" lang="en-US" sz="3200" spc="-1" strike="noStrike">
+              <a:solidFill>
+                <a:srgbClr val="ffffff"/>
+              </a:solidFill>
+              <a:uFill>
+                <a:solidFill>
+                  <a:srgbClr val="ffffff"/>
+                </a:solidFill>
+              </a:uFill>
+              <a:latin typeface="Arial"/>
+            </a:endParaRPr>
+          </a:p>
+        </p:txBody>
+      </p:sp>
+      <p:sp>
+        <p:nvSpPr>
+          <p:cNvPr id="33" name="PlaceHolder 3"/>
           <p:cNvSpPr>
             <a:spLocks noGrp="1"/>
           </p:cNvSpPr>
@@ -472,7 +475,7 @@
         <p:spPr>
           <a:xfrm>
             <a:off x="311760" y="1152360"/>
-            <a:ext cx="8520120" cy="3416040"/>
+            <a:ext cx="8519760" cy="3415680"/>
           </a:xfrm>
           <a:prstGeom prst="rect">
             <a:avLst/>
@@ -481,20 +484,43 @@
         <p:txBody>
           <a:bodyPr lIns="0" rIns="0" tIns="0" bIns="0"/>
           <a:p>
-            <a:endParaRPr b="0" lang="en-US" sz="1400" spc="-1" strike="noStrike">
-              <a:solidFill>
-                <a:srgbClr val="000000"/>
-              </a:solidFill>
-              <a:uFill>
-                <a:solidFill>
-                  <a:srgbClr val="ffffff"/>
-                </a:solidFill>
-              </a:uFill>
-              <a:latin typeface="Arial"/>
-            </a:endParaRPr>
-          </a:p>
-        </p:txBody>
-      </p:sp>
+            <a:endParaRPr b="0" lang="en-US" sz="3200" spc="-1" strike="noStrike">
+              <a:solidFill>
+                <a:srgbClr val="ffffff"/>
+              </a:solidFill>
+              <a:uFill>
+                <a:solidFill>
+                  <a:srgbClr val="ffffff"/>
+                </a:solidFill>
+              </a:uFill>
+              <a:latin typeface="Arial"/>
+            </a:endParaRPr>
+          </a:p>
+        </p:txBody>
+      </p:sp>
+      <p:pic>
+        <p:nvPicPr>
+          <p:cNvPr id="34" name="" descr=""/>
+          <p:cNvPicPr/>
+          <p:nvPr/>
+        </p:nvPicPr>
+        <p:blipFill>
+          <a:blip r:embed="rId2"/>
+          <a:stretch/>
+        </p:blipFill>
+        <p:spPr>
+          <a:xfrm>
+            <a:off x="2431080" y="1152360"/>
+            <a:ext cx="4280760" cy="3415680"/>
+          </a:xfrm>
+          <a:prstGeom prst="rect">
+            <a:avLst/>
+          </a:prstGeom>
+          <a:ln>
+            <a:noFill/>
+          </a:ln>
+        </p:spPr>
+      </p:pic>
       <p:pic>
         <p:nvPicPr>
           <p:cNvPr id="35" name="" descr=""/>
@@ -502,36 +528,13 @@
           <p:nvPr/>
         </p:nvPicPr>
         <p:blipFill>
-          <a:blip r:embed="rId2"/>
-          <a:stretch/>
-        </p:blipFill>
-        <p:spPr>
-          <a:xfrm>
-            <a:off x="2430720" y="1152000"/>
-            <a:ext cx="4281480" cy="3416040"/>
-          </a:xfrm>
-          <a:prstGeom prst="rect">
-            <a:avLst/>
-          </a:prstGeom>
-          <a:ln>
-            <a:noFill/>
-          </a:ln>
-        </p:spPr>
-      </p:pic>
-      <p:pic>
-        <p:nvPicPr>
-          <p:cNvPr id="36" name="" descr=""/>
-          <p:cNvPicPr/>
-          <p:nvPr/>
-        </p:nvPicPr>
-        <p:blipFill>
           <a:blip r:embed="rId3"/>
           <a:stretch/>
         </p:blipFill>
         <p:spPr>
           <a:xfrm>
-            <a:off x="2430720" y="1152000"/>
-            <a:ext cx="4281480" cy="3416040"/>
+            <a:off x="2431080" y="1152360"/>
+            <a:ext cx="4280760" cy="3415680"/>
           </a:xfrm>
           <a:prstGeom prst="rect">
             <a:avLst/>
@@ -587,7 +590,7 @@
       </p:grpSpPr>
       <p:sp>
         <p:nvSpPr>
-          <p:cNvPr id="40" name="PlaceHolder 1"/>
+          <p:cNvPr id="38" name="PlaceHolder 1"/>
           <p:cNvSpPr>
             <a:spLocks noGrp="1"/>
           </p:cNvSpPr>
@@ -597,8 +600,8 @@
         </p:nvSpPr>
         <p:spPr>
           <a:xfrm>
-            <a:off x="311760" y="444960"/>
-            <a:ext cx="8520120" cy="572400"/>
+            <a:off x="311760" y="418320"/>
+            <a:ext cx="8519760" cy="625320"/>
           </a:xfrm>
           <a:prstGeom prst="rect">
             <a:avLst/>
@@ -607,23 +610,24 @@
         <p:txBody>
           <a:bodyPr lIns="0" rIns="0" tIns="0" bIns="0" anchor="ctr"/>
           <a:p>
-            <a:endParaRPr b="0" lang="en-US" sz="1400" spc="-1" strike="noStrike">
-              <a:solidFill>
-                <a:srgbClr val="000000"/>
-              </a:solidFill>
-              <a:uFill>
-                <a:solidFill>
-                  <a:srgbClr val="ffffff"/>
-                </a:solidFill>
-              </a:uFill>
-              <a:latin typeface="Arial"/>
-            </a:endParaRPr>
-          </a:p>
-        </p:txBody>
-      </p:sp>
-      <p:sp>
-        <p:nvSpPr>
-          <p:cNvPr id="41" name="PlaceHolder 2"/>
+            <a:pPr algn="ctr"/>
+            <a:endParaRPr b="0" lang="en-US" sz="4400" spc="-1" strike="noStrike">
+              <a:solidFill>
+                <a:srgbClr val="ffffff"/>
+              </a:solidFill>
+              <a:uFill>
+                <a:solidFill>
+                  <a:srgbClr val="ffffff"/>
+                </a:solidFill>
+              </a:uFill>
+              <a:latin typeface="Arial"/>
+            </a:endParaRPr>
+          </a:p>
+        </p:txBody>
+      </p:sp>
+      <p:sp>
+        <p:nvSpPr>
+          <p:cNvPr id="39" name="PlaceHolder 2"/>
           <p:cNvSpPr>
             <a:spLocks noGrp="1"/>
           </p:cNvSpPr>
@@ -634,7 +638,7 @@
         <p:spPr>
           <a:xfrm>
             <a:off x="311760" y="1152360"/>
-            <a:ext cx="8520120" cy="3416040"/>
+            <a:ext cx="8519760" cy="3415680"/>
           </a:xfrm>
           <a:prstGeom prst="rect">
             <a:avLst/>
@@ -682,7 +686,7 @@
       </p:grpSpPr>
       <p:sp>
         <p:nvSpPr>
-          <p:cNvPr id="42" name="PlaceHolder 1"/>
+          <p:cNvPr id="40" name="PlaceHolder 1"/>
           <p:cNvSpPr>
             <a:spLocks noGrp="1"/>
           </p:cNvSpPr>
@@ -692,8 +696,8 @@
         </p:nvSpPr>
         <p:spPr>
           <a:xfrm>
-            <a:off x="311760" y="444960"/>
-            <a:ext cx="8520120" cy="572400"/>
+            <a:off x="311760" y="418320"/>
+            <a:ext cx="8519760" cy="625320"/>
           </a:xfrm>
           <a:prstGeom prst="rect">
             <a:avLst/>
@@ -702,23 +706,24 @@
         <p:txBody>
           <a:bodyPr lIns="0" rIns="0" tIns="0" bIns="0" anchor="ctr"/>
           <a:p>
-            <a:endParaRPr b="0" lang="en-US" sz="1400" spc="-1" strike="noStrike">
-              <a:solidFill>
-                <a:srgbClr val="000000"/>
-              </a:solidFill>
-              <a:uFill>
-                <a:solidFill>
-                  <a:srgbClr val="ffffff"/>
-                </a:solidFill>
-              </a:uFill>
-              <a:latin typeface="Arial"/>
-            </a:endParaRPr>
-          </a:p>
-        </p:txBody>
-      </p:sp>
-      <p:sp>
-        <p:nvSpPr>
-          <p:cNvPr id="43" name="PlaceHolder 2"/>
+            <a:pPr algn="ctr"/>
+            <a:endParaRPr b="0" lang="en-US" sz="4400" spc="-1" strike="noStrike">
+              <a:solidFill>
+                <a:srgbClr val="ffffff"/>
+              </a:solidFill>
+              <a:uFill>
+                <a:solidFill>
+                  <a:srgbClr val="ffffff"/>
+                </a:solidFill>
+              </a:uFill>
+              <a:latin typeface="Arial"/>
+            </a:endParaRPr>
+          </a:p>
+        </p:txBody>
+      </p:sp>
+      <p:sp>
+        <p:nvSpPr>
+          <p:cNvPr id="41" name="PlaceHolder 2"/>
           <p:cNvSpPr>
             <a:spLocks noGrp="1"/>
           </p:cNvSpPr>
@@ -729,7 +734,7 @@
         <p:spPr>
           <a:xfrm>
             <a:off x="311760" y="1152360"/>
-            <a:ext cx="8520120" cy="3416040"/>
+            <a:ext cx="8519760" cy="3415680"/>
           </a:xfrm>
           <a:prstGeom prst="rect">
             <a:avLst/>
@@ -738,9 +743,9 @@
         <p:txBody>
           <a:bodyPr lIns="0" rIns="0" tIns="0" bIns="0"/>
           <a:p>
-            <a:endParaRPr b="0" lang="en-US" sz="1400" spc="-1" strike="noStrike">
-              <a:solidFill>
-                <a:srgbClr val="000000"/>
+            <a:endParaRPr b="0" lang="en-US" sz="3200" spc="-1" strike="noStrike">
+              <a:solidFill>
+                <a:srgbClr val="ffffff"/>
               </a:solidFill>
               <a:uFill>
                 <a:solidFill>
@@ -776,7 +781,7 @@
       </p:grpSpPr>
       <p:sp>
         <p:nvSpPr>
-          <p:cNvPr id="44" name="PlaceHolder 1"/>
+          <p:cNvPr id="42" name="PlaceHolder 1"/>
           <p:cNvSpPr>
             <a:spLocks noGrp="1"/>
           </p:cNvSpPr>
@@ -786,8 +791,8 @@
         </p:nvSpPr>
         <p:spPr>
           <a:xfrm>
-            <a:off x="311760" y="444960"/>
-            <a:ext cx="8520120" cy="572400"/>
+            <a:off x="311760" y="418320"/>
+            <a:ext cx="8519760" cy="625320"/>
           </a:xfrm>
           <a:prstGeom prst="rect">
             <a:avLst/>
@@ -796,23 +801,24 @@
         <p:txBody>
           <a:bodyPr lIns="0" rIns="0" tIns="0" bIns="0" anchor="ctr"/>
           <a:p>
-            <a:endParaRPr b="0" lang="en-US" sz="1400" spc="-1" strike="noStrike">
-              <a:solidFill>
-                <a:srgbClr val="000000"/>
-              </a:solidFill>
-              <a:uFill>
-                <a:solidFill>
-                  <a:srgbClr val="ffffff"/>
-                </a:solidFill>
-              </a:uFill>
-              <a:latin typeface="Arial"/>
-            </a:endParaRPr>
-          </a:p>
-        </p:txBody>
-      </p:sp>
-      <p:sp>
-        <p:nvSpPr>
-          <p:cNvPr id="45" name="PlaceHolder 2"/>
+            <a:pPr algn="ctr"/>
+            <a:endParaRPr b="0" lang="en-US" sz="4400" spc="-1" strike="noStrike">
+              <a:solidFill>
+                <a:srgbClr val="ffffff"/>
+              </a:solidFill>
+              <a:uFill>
+                <a:solidFill>
+                  <a:srgbClr val="ffffff"/>
+                </a:solidFill>
+              </a:uFill>
+              <a:latin typeface="Arial"/>
+            </a:endParaRPr>
+          </a:p>
+        </p:txBody>
+      </p:sp>
+      <p:sp>
+        <p:nvSpPr>
+          <p:cNvPr id="43" name="PlaceHolder 2"/>
           <p:cNvSpPr>
             <a:spLocks noGrp="1"/>
           </p:cNvSpPr>
@@ -823,7 +829,7 @@
         <p:spPr>
           <a:xfrm>
             <a:off x="311760" y="1152360"/>
-            <a:ext cx="4157640" cy="3416040"/>
+            <a:ext cx="4157280" cy="3415680"/>
           </a:xfrm>
           <a:prstGeom prst="rect">
             <a:avLst/>
@@ -832,23 +838,23 @@
         <p:txBody>
           <a:bodyPr lIns="0" rIns="0" tIns="0" bIns="0"/>
           <a:p>
-            <a:endParaRPr b="0" lang="en-US" sz="1400" spc="-1" strike="noStrike">
-              <a:solidFill>
-                <a:srgbClr val="000000"/>
-              </a:solidFill>
-              <a:uFill>
-                <a:solidFill>
-                  <a:srgbClr val="ffffff"/>
-                </a:solidFill>
-              </a:uFill>
-              <a:latin typeface="Arial"/>
-            </a:endParaRPr>
-          </a:p>
-        </p:txBody>
-      </p:sp>
-      <p:sp>
-        <p:nvSpPr>
-          <p:cNvPr id="46" name="PlaceHolder 3"/>
+            <a:endParaRPr b="0" lang="en-US" sz="3200" spc="-1" strike="noStrike">
+              <a:solidFill>
+                <a:srgbClr val="ffffff"/>
+              </a:solidFill>
+              <a:uFill>
+                <a:solidFill>
+                  <a:srgbClr val="ffffff"/>
+                </a:solidFill>
+              </a:uFill>
+              <a:latin typeface="Arial"/>
+            </a:endParaRPr>
+          </a:p>
+        </p:txBody>
+      </p:sp>
+      <p:sp>
+        <p:nvSpPr>
+          <p:cNvPr id="44" name="PlaceHolder 3"/>
           <p:cNvSpPr>
             <a:spLocks noGrp="1"/>
           </p:cNvSpPr>
@@ -858,8 +864,8 @@
         </p:nvSpPr>
         <p:spPr>
           <a:xfrm>
-            <a:off x="4677840" y="1152360"/>
-            <a:ext cx="4157640" cy="3416040"/>
+            <a:off x="4677120" y="1152360"/>
+            <a:ext cx="4157280" cy="3415680"/>
           </a:xfrm>
           <a:prstGeom prst="rect">
             <a:avLst/>
@@ -868,9 +874,9 @@
         <p:txBody>
           <a:bodyPr lIns="0" rIns="0" tIns="0" bIns="0"/>
           <a:p>
-            <a:endParaRPr b="0" lang="en-US" sz="1400" spc="-1" strike="noStrike">
-              <a:solidFill>
-                <a:srgbClr val="000000"/>
+            <a:endParaRPr b="0" lang="en-US" sz="3200" spc="-1" strike="noStrike">
+              <a:solidFill>
+                <a:srgbClr val="ffffff"/>
               </a:solidFill>
               <a:uFill>
                 <a:solidFill>
@@ -906,7 +912,7 @@
       </p:grpSpPr>
       <p:sp>
         <p:nvSpPr>
-          <p:cNvPr id="47" name="PlaceHolder 1"/>
+          <p:cNvPr id="45" name="PlaceHolder 1"/>
           <p:cNvSpPr>
             <a:spLocks noGrp="1"/>
           </p:cNvSpPr>
@@ -916,8 +922,8 @@
         </p:nvSpPr>
         <p:spPr>
           <a:xfrm>
-            <a:off x="311760" y="444960"/>
-            <a:ext cx="8520120" cy="572400"/>
+            <a:off x="311760" y="418320"/>
+            <a:ext cx="8519760" cy="625320"/>
           </a:xfrm>
           <a:prstGeom prst="rect">
             <a:avLst/>
@@ -926,9 +932,10 @@
         <p:txBody>
           <a:bodyPr lIns="0" rIns="0" tIns="0" bIns="0" anchor="ctr"/>
           <a:p>
-            <a:endParaRPr b="0" lang="en-US" sz="1400" spc="-1" strike="noStrike">
-              <a:solidFill>
-                <a:srgbClr val="000000"/>
+            <a:pPr algn="ctr"/>
+            <a:endParaRPr b="0" lang="en-US" sz="4400" spc="-1" strike="noStrike">
+              <a:solidFill>
+                <a:srgbClr val="ffffff"/>
               </a:solidFill>
               <a:uFill>
                 <a:solidFill>
@@ -964,7 +971,7 @@
       </p:grpSpPr>
       <p:sp>
         <p:nvSpPr>
-          <p:cNvPr id="48" name="PlaceHolder 1"/>
+          <p:cNvPr id="46" name="PlaceHolder 1"/>
           <p:cNvSpPr>
             <a:spLocks noGrp="1"/>
           </p:cNvSpPr>
@@ -975,7 +982,7 @@
         <p:spPr>
           <a:xfrm>
             <a:off x="311760" y="444960"/>
-            <a:ext cx="8520120" cy="2654640"/>
+            <a:ext cx="8519760" cy="2652840"/>
           </a:xfrm>
           <a:prstGeom prst="rect">
             <a:avLst/>
@@ -1023,7 +1030,7 @@
       </p:grpSpPr>
       <p:sp>
         <p:nvSpPr>
-          <p:cNvPr id="49" name="PlaceHolder 1"/>
+          <p:cNvPr id="47" name="PlaceHolder 1"/>
           <p:cNvSpPr>
             <a:spLocks noGrp="1"/>
           </p:cNvSpPr>
@@ -1033,8 +1040,8 @@
         </p:nvSpPr>
         <p:spPr>
           <a:xfrm>
-            <a:off x="311760" y="444960"/>
-            <a:ext cx="8520120" cy="572400"/>
+            <a:off x="311760" y="418320"/>
+            <a:ext cx="8519760" cy="625320"/>
           </a:xfrm>
           <a:prstGeom prst="rect">
             <a:avLst/>
@@ -1043,23 +1050,24 @@
         <p:txBody>
           <a:bodyPr lIns="0" rIns="0" tIns="0" bIns="0" anchor="ctr"/>
           <a:p>
-            <a:endParaRPr b="0" lang="en-US" sz="1400" spc="-1" strike="noStrike">
-              <a:solidFill>
-                <a:srgbClr val="000000"/>
-              </a:solidFill>
-              <a:uFill>
-                <a:solidFill>
-                  <a:srgbClr val="ffffff"/>
-                </a:solidFill>
-              </a:uFill>
-              <a:latin typeface="Arial"/>
-            </a:endParaRPr>
-          </a:p>
-        </p:txBody>
-      </p:sp>
-      <p:sp>
-        <p:nvSpPr>
-          <p:cNvPr id="50" name="PlaceHolder 2"/>
+            <a:pPr algn="ctr"/>
+            <a:endParaRPr b="0" lang="en-US" sz="4400" spc="-1" strike="noStrike">
+              <a:solidFill>
+                <a:srgbClr val="ffffff"/>
+              </a:solidFill>
+              <a:uFill>
+                <a:solidFill>
+                  <a:srgbClr val="ffffff"/>
+                </a:solidFill>
+              </a:uFill>
+              <a:latin typeface="Arial"/>
+            </a:endParaRPr>
+          </a:p>
+        </p:txBody>
+      </p:sp>
+      <p:sp>
+        <p:nvSpPr>
+          <p:cNvPr id="48" name="PlaceHolder 2"/>
           <p:cNvSpPr>
             <a:spLocks noGrp="1"/>
           </p:cNvSpPr>
@@ -1070,7 +1078,7 @@
         <p:spPr>
           <a:xfrm>
             <a:off x="311760" y="1152360"/>
-            <a:ext cx="4157640" cy="1629360"/>
+            <a:ext cx="4157280" cy="1629000"/>
           </a:xfrm>
           <a:prstGeom prst="rect">
             <a:avLst/>
@@ -1079,23 +1087,23 @@
         <p:txBody>
           <a:bodyPr lIns="0" rIns="0" tIns="0" bIns="0"/>
           <a:p>
-            <a:endParaRPr b="0" lang="en-US" sz="1400" spc="-1" strike="noStrike">
-              <a:solidFill>
-                <a:srgbClr val="000000"/>
-              </a:solidFill>
-              <a:uFill>
-                <a:solidFill>
-                  <a:srgbClr val="ffffff"/>
-                </a:solidFill>
-              </a:uFill>
-              <a:latin typeface="Arial"/>
-            </a:endParaRPr>
-          </a:p>
-        </p:txBody>
-      </p:sp>
-      <p:sp>
-        <p:nvSpPr>
-          <p:cNvPr id="51" name="PlaceHolder 3"/>
+            <a:endParaRPr b="0" lang="en-US" sz="3200" spc="-1" strike="noStrike">
+              <a:solidFill>
+                <a:srgbClr val="ffffff"/>
+              </a:solidFill>
+              <a:uFill>
+                <a:solidFill>
+                  <a:srgbClr val="ffffff"/>
+                </a:solidFill>
+              </a:uFill>
+              <a:latin typeface="Arial"/>
+            </a:endParaRPr>
+          </a:p>
+        </p:txBody>
+      </p:sp>
+      <p:sp>
+        <p:nvSpPr>
+          <p:cNvPr id="49" name="PlaceHolder 3"/>
           <p:cNvSpPr>
             <a:spLocks noGrp="1"/>
           </p:cNvSpPr>
@@ -1105,8 +1113,8 @@
         </p:nvSpPr>
         <p:spPr>
           <a:xfrm>
-            <a:off x="311760" y="2936880"/>
-            <a:ext cx="4157640" cy="1629360"/>
+            <a:off x="311760" y="2936520"/>
+            <a:ext cx="4157280" cy="1629000"/>
           </a:xfrm>
           <a:prstGeom prst="rect">
             <a:avLst/>
@@ -1115,23 +1123,23 @@
         <p:txBody>
           <a:bodyPr lIns="0" rIns="0" tIns="0" bIns="0"/>
           <a:p>
-            <a:endParaRPr b="0" lang="en-US" sz="1400" spc="-1" strike="noStrike">
-              <a:solidFill>
-                <a:srgbClr val="000000"/>
-              </a:solidFill>
-              <a:uFill>
-                <a:solidFill>
-                  <a:srgbClr val="ffffff"/>
-                </a:solidFill>
-              </a:uFill>
-              <a:latin typeface="Arial"/>
-            </a:endParaRPr>
-          </a:p>
-        </p:txBody>
-      </p:sp>
-      <p:sp>
-        <p:nvSpPr>
-          <p:cNvPr id="52" name="PlaceHolder 4"/>
+            <a:endParaRPr b="0" lang="en-US" sz="3200" spc="-1" strike="noStrike">
+              <a:solidFill>
+                <a:srgbClr val="ffffff"/>
+              </a:solidFill>
+              <a:uFill>
+                <a:solidFill>
+                  <a:srgbClr val="ffffff"/>
+                </a:solidFill>
+              </a:uFill>
+              <a:latin typeface="Arial"/>
+            </a:endParaRPr>
+          </a:p>
+        </p:txBody>
+      </p:sp>
+      <p:sp>
+        <p:nvSpPr>
+          <p:cNvPr id="50" name="PlaceHolder 4"/>
           <p:cNvSpPr>
             <a:spLocks noGrp="1"/>
           </p:cNvSpPr>
@@ -1141,8 +1149,8 @@
         </p:nvSpPr>
         <p:spPr>
           <a:xfrm>
-            <a:off x="4677840" y="1152360"/>
-            <a:ext cx="4157640" cy="3416040"/>
+            <a:off x="4677120" y="1152360"/>
+            <a:ext cx="4157280" cy="3415680"/>
           </a:xfrm>
           <a:prstGeom prst="rect">
             <a:avLst/>
@@ -1151,9 +1159,9 @@
         <p:txBody>
           <a:bodyPr lIns="0" rIns="0" tIns="0" bIns="0"/>
           <a:p>
-            <a:endParaRPr b="0" lang="en-US" sz="1400" spc="-1" strike="noStrike">
-              <a:solidFill>
-                <a:srgbClr val="000000"/>
+            <a:endParaRPr b="0" lang="en-US" sz="3200" spc="-1" strike="noStrike">
+              <a:solidFill>
+                <a:srgbClr val="ffffff"/>
               </a:solidFill>
               <a:uFill>
                 <a:solidFill>
@@ -1189,7 +1197,7 @@
       </p:grpSpPr>
       <p:sp>
         <p:nvSpPr>
-          <p:cNvPr id="3" name="PlaceHolder 1"/>
+          <p:cNvPr id="2" name="PlaceHolder 1"/>
           <p:cNvSpPr>
             <a:spLocks noGrp="1"/>
           </p:cNvSpPr>
@@ -1199,8 +1207,8 @@
         </p:nvSpPr>
         <p:spPr>
           <a:xfrm>
-            <a:off x="311760" y="444960"/>
-            <a:ext cx="8520120" cy="572400"/>
+            <a:off x="311760" y="418320"/>
+            <a:ext cx="8519760" cy="625320"/>
           </a:xfrm>
           <a:prstGeom prst="rect">
             <a:avLst/>
@@ -1209,23 +1217,24 @@
         <p:txBody>
           <a:bodyPr lIns="0" rIns="0" tIns="0" bIns="0" anchor="ctr"/>
           <a:p>
-            <a:endParaRPr b="0" lang="en-US" sz="1400" spc="-1" strike="noStrike">
-              <a:solidFill>
-                <a:srgbClr val="000000"/>
-              </a:solidFill>
-              <a:uFill>
-                <a:solidFill>
-                  <a:srgbClr val="ffffff"/>
-                </a:solidFill>
-              </a:uFill>
-              <a:latin typeface="Arial"/>
-            </a:endParaRPr>
-          </a:p>
-        </p:txBody>
-      </p:sp>
-      <p:sp>
-        <p:nvSpPr>
-          <p:cNvPr id="4" name="PlaceHolder 2"/>
+            <a:pPr algn="ctr"/>
+            <a:endParaRPr b="0" lang="en-US" sz="4400" spc="-1" strike="noStrike">
+              <a:solidFill>
+                <a:srgbClr val="ffffff"/>
+              </a:solidFill>
+              <a:uFill>
+                <a:solidFill>
+                  <a:srgbClr val="ffffff"/>
+                </a:solidFill>
+              </a:uFill>
+              <a:latin typeface="Arial"/>
+            </a:endParaRPr>
+          </a:p>
+        </p:txBody>
+      </p:sp>
+      <p:sp>
+        <p:nvSpPr>
+          <p:cNvPr id="3" name="PlaceHolder 2"/>
           <p:cNvSpPr>
             <a:spLocks noGrp="1"/>
           </p:cNvSpPr>
@@ -1236,7 +1245,7 @@
         <p:spPr>
           <a:xfrm>
             <a:off x="311760" y="1152360"/>
-            <a:ext cx="8520120" cy="3416040"/>
+            <a:ext cx="8519760" cy="3415680"/>
           </a:xfrm>
           <a:prstGeom prst="rect">
             <a:avLst/>
@@ -1284,7 +1293,7 @@
       </p:grpSpPr>
       <p:sp>
         <p:nvSpPr>
-          <p:cNvPr id="53" name="PlaceHolder 1"/>
+          <p:cNvPr id="51" name="PlaceHolder 1"/>
           <p:cNvSpPr>
             <a:spLocks noGrp="1"/>
           </p:cNvSpPr>
@@ -1294,8 +1303,8 @@
         </p:nvSpPr>
         <p:spPr>
           <a:xfrm>
-            <a:off x="311760" y="444960"/>
-            <a:ext cx="8520120" cy="572400"/>
+            <a:off x="311760" y="418320"/>
+            <a:ext cx="8519760" cy="625320"/>
           </a:xfrm>
           <a:prstGeom prst="rect">
             <a:avLst/>
@@ -1304,23 +1313,24 @@
         <p:txBody>
           <a:bodyPr lIns="0" rIns="0" tIns="0" bIns="0" anchor="ctr"/>
           <a:p>
-            <a:endParaRPr b="0" lang="en-US" sz="1400" spc="-1" strike="noStrike">
-              <a:solidFill>
-                <a:srgbClr val="000000"/>
-              </a:solidFill>
-              <a:uFill>
-                <a:solidFill>
-                  <a:srgbClr val="ffffff"/>
-                </a:solidFill>
-              </a:uFill>
-              <a:latin typeface="Arial"/>
-            </a:endParaRPr>
-          </a:p>
-        </p:txBody>
-      </p:sp>
-      <p:sp>
-        <p:nvSpPr>
-          <p:cNvPr id="54" name="PlaceHolder 2"/>
+            <a:pPr algn="ctr"/>
+            <a:endParaRPr b="0" lang="en-US" sz="4400" spc="-1" strike="noStrike">
+              <a:solidFill>
+                <a:srgbClr val="ffffff"/>
+              </a:solidFill>
+              <a:uFill>
+                <a:solidFill>
+                  <a:srgbClr val="ffffff"/>
+                </a:solidFill>
+              </a:uFill>
+              <a:latin typeface="Arial"/>
+            </a:endParaRPr>
+          </a:p>
+        </p:txBody>
+      </p:sp>
+      <p:sp>
+        <p:nvSpPr>
+          <p:cNvPr id="52" name="PlaceHolder 2"/>
           <p:cNvSpPr>
             <a:spLocks noGrp="1"/>
           </p:cNvSpPr>
@@ -1331,7 +1341,7 @@
         <p:spPr>
           <a:xfrm>
             <a:off x="311760" y="1152360"/>
-            <a:ext cx="4157640" cy="3416040"/>
+            <a:ext cx="4157280" cy="3415680"/>
           </a:xfrm>
           <a:prstGeom prst="rect">
             <a:avLst/>
@@ -1340,23 +1350,23 @@
         <p:txBody>
           <a:bodyPr lIns="0" rIns="0" tIns="0" bIns="0"/>
           <a:p>
-            <a:endParaRPr b="0" lang="en-US" sz="1400" spc="-1" strike="noStrike">
-              <a:solidFill>
-                <a:srgbClr val="000000"/>
-              </a:solidFill>
-              <a:uFill>
-                <a:solidFill>
-                  <a:srgbClr val="ffffff"/>
-                </a:solidFill>
-              </a:uFill>
-              <a:latin typeface="Arial"/>
-            </a:endParaRPr>
-          </a:p>
-        </p:txBody>
-      </p:sp>
-      <p:sp>
-        <p:nvSpPr>
-          <p:cNvPr id="55" name="PlaceHolder 3"/>
+            <a:endParaRPr b="0" lang="en-US" sz="3200" spc="-1" strike="noStrike">
+              <a:solidFill>
+                <a:srgbClr val="ffffff"/>
+              </a:solidFill>
+              <a:uFill>
+                <a:solidFill>
+                  <a:srgbClr val="ffffff"/>
+                </a:solidFill>
+              </a:uFill>
+              <a:latin typeface="Arial"/>
+            </a:endParaRPr>
+          </a:p>
+        </p:txBody>
+      </p:sp>
+      <p:sp>
+        <p:nvSpPr>
+          <p:cNvPr id="53" name="PlaceHolder 3"/>
           <p:cNvSpPr>
             <a:spLocks noGrp="1"/>
           </p:cNvSpPr>
@@ -1366,8 +1376,8 @@
         </p:nvSpPr>
         <p:spPr>
           <a:xfrm>
-            <a:off x="4677840" y="1152360"/>
-            <a:ext cx="4157640" cy="1629360"/>
+            <a:off x="4677120" y="1152360"/>
+            <a:ext cx="4157280" cy="1629000"/>
           </a:xfrm>
           <a:prstGeom prst="rect">
             <a:avLst/>
@@ -1376,23 +1386,23 @@
         <p:txBody>
           <a:bodyPr lIns="0" rIns="0" tIns="0" bIns="0"/>
           <a:p>
-            <a:endParaRPr b="0" lang="en-US" sz="1400" spc="-1" strike="noStrike">
-              <a:solidFill>
-                <a:srgbClr val="000000"/>
-              </a:solidFill>
-              <a:uFill>
-                <a:solidFill>
-                  <a:srgbClr val="ffffff"/>
-                </a:solidFill>
-              </a:uFill>
-              <a:latin typeface="Arial"/>
-            </a:endParaRPr>
-          </a:p>
-        </p:txBody>
-      </p:sp>
-      <p:sp>
-        <p:nvSpPr>
-          <p:cNvPr id="56" name="PlaceHolder 4"/>
+            <a:endParaRPr b="0" lang="en-US" sz="3200" spc="-1" strike="noStrike">
+              <a:solidFill>
+                <a:srgbClr val="ffffff"/>
+              </a:solidFill>
+              <a:uFill>
+                <a:solidFill>
+                  <a:srgbClr val="ffffff"/>
+                </a:solidFill>
+              </a:uFill>
+              <a:latin typeface="Arial"/>
+            </a:endParaRPr>
+          </a:p>
+        </p:txBody>
+      </p:sp>
+      <p:sp>
+        <p:nvSpPr>
+          <p:cNvPr id="54" name="PlaceHolder 4"/>
           <p:cNvSpPr>
             <a:spLocks noGrp="1"/>
           </p:cNvSpPr>
@@ -1402,8 +1412,8 @@
         </p:nvSpPr>
         <p:spPr>
           <a:xfrm>
-            <a:off x="4677840" y="2936880"/>
-            <a:ext cx="4157640" cy="1629360"/>
+            <a:off x="4677120" y="2936520"/>
+            <a:ext cx="4157280" cy="1629000"/>
           </a:xfrm>
           <a:prstGeom prst="rect">
             <a:avLst/>
@@ -1412,9 +1422,9 @@
         <p:txBody>
           <a:bodyPr lIns="0" rIns="0" tIns="0" bIns="0"/>
           <a:p>
-            <a:endParaRPr b="0" lang="en-US" sz="1400" spc="-1" strike="noStrike">
-              <a:solidFill>
-                <a:srgbClr val="000000"/>
+            <a:endParaRPr b="0" lang="en-US" sz="3200" spc="-1" strike="noStrike">
+              <a:solidFill>
+                <a:srgbClr val="ffffff"/>
               </a:solidFill>
               <a:uFill>
                 <a:solidFill>
@@ -1450,7 +1460,7 @@
       </p:grpSpPr>
       <p:sp>
         <p:nvSpPr>
-          <p:cNvPr id="57" name="PlaceHolder 1"/>
+          <p:cNvPr id="55" name="PlaceHolder 1"/>
           <p:cNvSpPr>
             <a:spLocks noGrp="1"/>
           </p:cNvSpPr>
@@ -1460,8 +1470,8 @@
         </p:nvSpPr>
         <p:spPr>
           <a:xfrm>
-            <a:off x="311760" y="444960"/>
-            <a:ext cx="8520120" cy="572400"/>
+            <a:off x="311760" y="418320"/>
+            <a:ext cx="8519760" cy="625320"/>
           </a:xfrm>
           <a:prstGeom prst="rect">
             <a:avLst/>
@@ -1470,23 +1480,24 @@
         <p:txBody>
           <a:bodyPr lIns="0" rIns="0" tIns="0" bIns="0" anchor="ctr"/>
           <a:p>
-            <a:endParaRPr b="0" lang="en-US" sz="1400" spc="-1" strike="noStrike">
-              <a:solidFill>
-                <a:srgbClr val="000000"/>
-              </a:solidFill>
-              <a:uFill>
-                <a:solidFill>
-                  <a:srgbClr val="ffffff"/>
-                </a:solidFill>
-              </a:uFill>
-              <a:latin typeface="Arial"/>
-            </a:endParaRPr>
-          </a:p>
-        </p:txBody>
-      </p:sp>
-      <p:sp>
-        <p:nvSpPr>
-          <p:cNvPr id="58" name="PlaceHolder 2"/>
+            <a:pPr algn="ctr"/>
+            <a:endParaRPr b="0" lang="en-US" sz="4400" spc="-1" strike="noStrike">
+              <a:solidFill>
+                <a:srgbClr val="ffffff"/>
+              </a:solidFill>
+              <a:uFill>
+                <a:solidFill>
+                  <a:srgbClr val="ffffff"/>
+                </a:solidFill>
+              </a:uFill>
+              <a:latin typeface="Arial"/>
+            </a:endParaRPr>
+          </a:p>
+        </p:txBody>
+      </p:sp>
+      <p:sp>
+        <p:nvSpPr>
+          <p:cNvPr id="56" name="PlaceHolder 2"/>
           <p:cNvSpPr>
             <a:spLocks noGrp="1"/>
           </p:cNvSpPr>
@@ -1497,7 +1508,7 @@
         <p:spPr>
           <a:xfrm>
             <a:off x="311760" y="1152360"/>
-            <a:ext cx="4157640" cy="1629360"/>
+            <a:ext cx="4157280" cy="1629000"/>
           </a:xfrm>
           <a:prstGeom prst="rect">
             <a:avLst/>
@@ -1506,23 +1517,23 @@
         <p:txBody>
           <a:bodyPr lIns="0" rIns="0" tIns="0" bIns="0"/>
           <a:p>
-            <a:endParaRPr b="0" lang="en-US" sz="1400" spc="-1" strike="noStrike">
-              <a:solidFill>
-                <a:srgbClr val="000000"/>
-              </a:solidFill>
-              <a:uFill>
-                <a:solidFill>
-                  <a:srgbClr val="ffffff"/>
-                </a:solidFill>
-              </a:uFill>
-              <a:latin typeface="Arial"/>
-            </a:endParaRPr>
-          </a:p>
-        </p:txBody>
-      </p:sp>
-      <p:sp>
-        <p:nvSpPr>
-          <p:cNvPr id="59" name="PlaceHolder 3"/>
+            <a:endParaRPr b="0" lang="en-US" sz="3200" spc="-1" strike="noStrike">
+              <a:solidFill>
+                <a:srgbClr val="ffffff"/>
+              </a:solidFill>
+              <a:uFill>
+                <a:solidFill>
+                  <a:srgbClr val="ffffff"/>
+                </a:solidFill>
+              </a:uFill>
+              <a:latin typeface="Arial"/>
+            </a:endParaRPr>
+          </a:p>
+        </p:txBody>
+      </p:sp>
+      <p:sp>
+        <p:nvSpPr>
+          <p:cNvPr id="57" name="PlaceHolder 3"/>
           <p:cNvSpPr>
             <a:spLocks noGrp="1"/>
           </p:cNvSpPr>
@@ -1532,8 +1543,8 @@
         </p:nvSpPr>
         <p:spPr>
           <a:xfrm>
-            <a:off x="4677840" y="1152360"/>
-            <a:ext cx="4157640" cy="1629360"/>
+            <a:off x="4677120" y="1152360"/>
+            <a:ext cx="4157280" cy="1629000"/>
           </a:xfrm>
           <a:prstGeom prst="rect">
             <a:avLst/>
@@ -1542,23 +1553,23 @@
         <p:txBody>
           <a:bodyPr lIns="0" rIns="0" tIns="0" bIns="0"/>
           <a:p>
-            <a:endParaRPr b="0" lang="en-US" sz="1400" spc="-1" strike="noStrike">
-              <a:solidFill>
-                <a:srgbClr val="000000"/>
-              </a:solidFill>
-              <a:uFill>
-                <a:solidFill>
-                  <a:srgbClr val="ffffff"/>
-                </a:solidFill>
-              </a:uFill>
-              <a:latin typeface="Arial"/>
-            </a:endParaRPr>
-          </a:p>
-        </p:txBody>
-      </p:sp>
-      <p:sp>
-        <p:nvSpPr>
-          <p:cNvPr id="60" name="PlaceHolder 4"/>
+            <a:endParaRPr b="0" lang="en-US" sz="3200" spc="-1" strike="noStrike">
+              <a:solidFill>
+                <a:srgbClr val="ffffff"/>
+              </a:solidFill>
+              <a:uFill>
+                <a:solidFill>
+                  <a:srgbClr val="ffffff"/>
+                </a:solidFill>
+              </a:uFill>
+              <a:latin typeface="Arial"/>
+            </a:endParaRPr>
+          </a:p>
+        </p:txBody>
+      </p:sp>
+      <p:sp>
+        <p:nvSpPr>
+          <p:cNvPr id="58" name="PlaceHolder 4"/>
           <p:cNvSpPr>
             <a:spLocks noGrp="1"/>
           </p:cNvSpPr>
@@ -1568,8 +1579,8 @@
         </p:nvSpPr>
         <p:spPr>
           <a:xfrm>
-            <a:off x="311760" y="2936880"/>
-            <a:ext cx="8520120" cy="1629360"/>
+            <a:off x="311760" y="2936520"/>
+            <a:ext cx="8519760" cy="1629000"/>
           </a:xfrm>
           <a:prstGeom prst="rect">
             <a:avLst/>
@@ -1578,9 +1589,9 @@
         <p:txBody>
           <a:bodyPr lIns="0" rIns="0" tIns="0" bIns="0"/>
           <a:p>
-            <a:endParaRPr b="0" lang="en-US" sz="1400" spc="-1" strike="noStrike">
-              <a:solidFill>
-                <a:srgbClr val="000000"/>
+            <a:endParaRPr b="0" lang="en-US" sz="3200" spc="-1" strike="noStrike">
+              <a:solidFill>
+                <a:srgbClr val="ffffff"/>
               </a:solidFill>
               <a:uFill>
                 <a:solidFill>
@@ -1616,7 +1627,7 @@
       </p:grpSpPr>
       <p:sp>
         <p:nvSpPr>
-          <p:cNvPr id="61" name="PlaceHolder 1"/>
+          <p:cNvPr id="59" name="PlaceHolder 1"/>
           <p:cNvSpPr>
             <a:spLocks noGrp="1"/>
           </p:cNvSpPr>
@@ -1626,8 +1637,8 @@
         </p:nvSpPr>
         <p:spPr>
           <a:xfrm>
-            <a:off x="311760" y="444960"/>
-            <a:ext cx="8520120" cy="572400"/>
+            <a:off x="311760" y="418320"/>
+            <a:ext cx="8519760" cy="625320"/>
           </a:xfrm>
           <a:prstGeom prst="rect">
             <a:avLst/>
@@ -1636,23 +1647,24 @@
         <p:txBody>
           <a:bodyPr lIns="0" rIns="0" tIns="0" bIns="0" anchor="ctr"/>
           <a:p>
-            <a:endParaRPr b="0" lang="en-US" sz="1400" spc="-1" strike="noStrike">
-              <a:solidFill>
-                <a:srgbClr val="000000"/>
-              </a:solidFill>
-              <a:uFill>
-                <a:solidFill>
-                  <a:srgbClr val="ffffff"/>
-                </a:solidFill>
-              </a:uFill>
-              <a:latin typeface="Arial"/>
-            </a:endParaRPr>
-          </a:p>
-        </p:txBody>
-      </p:sp>
-      <p:sp>
-        <p:nvSpPr>
-          <p:cNvPr id="62" name="PlaceHolder 2"/>
+            <a:pPr algn="ctr"/>
+            <a:endParaRPr b="0" lang="en-US" sz="4400" spc="-1" strike="noStrike">
+              <a:solidFill>
+                <a:srgbClr val="ffffff"/>
+              </a:solidFill>
+              <a:uFill>
+                <a:solidFill>
+                  <a:srgbClr val="ffffff"/>
+                </a:solidFill>
+              </a:uFill>
+              <a:latin typeface="Arial"/>
+            </a:endParaRPr>
+          </a:p>
+        </p:txBody>
+      </p:sp>
+      <p:sp>
+        <p:nvSpPr>
+          <p:cNvPr id="60" name="PlaceHolder 2"/>
           <p:cNvSpPr>
             <a:spLocks noGrp="1"/>
           </p:cNvSpPr>
@@ -1663,7 +1675,7 @@
         <p:spPr>
           <a:xfrm>
             <a:off x="311760" y="1152360"/>
-            <a:ext cx="8520120" cy="1629360"/>
+            <a:ext cx="8519760" cy="1629000"/>
           </a:xfrm>
           <a:prstGeom prst="rect">
             <a:avLst/>
@@ -1672,23 +1684,23 @@
         <p:txBody>
           <a:bodyPr lIns="0" rIns="0" tIns="0" bIns="0"/>
           <a:p>
-            <a:endParaRPr b="0" lang="en-US" sz="1400" spc="-1" strike="noStrike">
-              <a:solidFill>
-                <a:srgbClr val="000000"/>
-              </a:solidFill>
-              <a:uFill>
-                <a:solidFill>
-                  <a:srgbClr val="ffffff"/>
-                </a:solidFill>
-              </a:uFill>
-              <a:latin typeface="Arial"/>
-            </a:endParaRPr>
-          </a:p>
-        </p:txBody>
-      </p:sp>
-      <p:sp>
-        <p:nvSpPr>
-          <p:cNvPr id="63" name="PlaceHolder 3"/>
+            <a:endParaRPr b="0" lang="en-US" sz="3200" spc="-1" strike="noStrike">
+              <a:solidFill>
+                <a:srgbClr val="ffffff"/>
+              </a:solidFill>
+              <a:uFill>
+                <a:solidFill>
+                  <a:srgbClr val="ffffff"/>
+                </a:solidFill>
+              </a:uFill>
+              <a:latin typeface="Arial"/>
+            </a:endParaRPr>
+          </a:p>
+        </p:txBody>
+      </p:sp>
+      <p:sp>
+        <p:nvSpPr>
+          <p:cNvPr id="61" name="PlaceHolder 3"/>
           <p:cNvSpPr>
             <a:spLocks noGrp="1"/>
           </p:cNvSpPr>
@@ -1698,8 +1710,8 @@
         </p:nvSpPr>
         <p:spPr>
           <a:xfrm>
-            <a:off x="311760" y="2936880"/>
-            <a:ext cx="8520120" cy="1629360"/>
+            <a:off x="311760" y="2936520"/>
+            <a:ext cx="8519760" cy="1629000"/>
           </a:xfrm>
           <a:prstGeom prst="rect">
             <a:avLst/>
@@ -1708,9 +1720,9 @@
         <p:txBody>
           <a:bodyPr lIns="0" rIns="0" tIns="0" bIns="0"/>
           <a:p>
-            <a:endParaRPr b="0" lang="en-US" sz="1400" spc="-1" strike="noStrike">
-              <a:solidFill>
-                <a:srgbClr val="000000"/>
+            <a:endParaRPr b="0" lang="en-US" sz="3200" spc="-1" strike="noStrike">
+              <a:solidFill>
+                <a:srgbClr val="ffffff"/>
               </a:solidFill>
               <a:uFill>
                 <a:solidFill>
@@ -1746,7 +1758,7 @@
       </p:grpSpPr>
       <p:sp>
         <p:nvSpPr>
-          <p:cNvPr id="64" name="PlaceHolder 1"/>
+          <p:cNvPr id="62" name="PlaceHolder 1"/>
           <p:cNvSpPr>
             <a:spLocks noGrp="1"/>
           </p:cNvSpPr>
@@ -1756,8 +1768,8 @@
         </p:nvSpPr>
         <p:spPr>
           <a:xfrm>
-            <a:off x="311760" y="444960"/>
-            <a:ext cx="8520120" cy="572400"/>
+            <a:off x="311760" y="418320"/>
+            <a:ext cx="8519760" cy="625320"/>
           </a:xfrm>
           <a:prstGeom prst="rect">
             <a:avLst/>
@@ -1766,23 +1778,24 @@
         <p:txBody>
           <a:bodyPr lIns="0" rIns="0" tIns="0" bIns="0" anchor="ctr"/>
           <a:p>
-            <a:endParaRPr b="0" lang="en-US" sz="1400" spc="-1" strike="noStrike">
-              <a:solidFill>
-                <a:srgbClr val="000000"/>
-              </a:solidFill>
-              <a:uFill>
-                <a:solidFill>
-                  <a:srgbClr val="ffffff"/>
-                </a:solidFill>
-              </a:uFill>
-              <a:latin typeface="Arial"/>
-            </a:endParaRPr>
-          </a:p>
-        </p:txBody>
-      </p:sp>
-      <p:sp>
-        <p:nvSpPr>
-          <p:cNvPr id="65" name="PlaceHolder 2"/>
+            <a:pPr algn="ctr"/>
+            <a:endParaRPr b="0" lang="en-US" sz="4400" spc="-1" strike="noStrike">
+              <a:solidFill>
+                <a:srgbClr val="ffffff"/>
+              </a:solidFill>
+              <a:uFill>
+                <a:solidFill>
+                  <a:srgbClr val="ffffff"/>
+                </a:solidFill>
+              </a:uFill>
+              <a:latin typeface="Arial"/>
+            </a:endParaRPr>
+          </a:p>
+        </p:txBody>
+      </p:sp>
+      <p:sp>
+        <p:nvSpPr>
+          <p:cNvPr id="63" name="PlaceHolder 2"/>
           <p:cNvSpPr>
             <a:spLocks noGrp="1"/>
           </p:cNvSpPr>
@@ -1793,7 +1806,7 @@
         <p:spPr>
           <a:xfrm>
             <a:off x="311760" y="1152360"/>
-            <a:ext cx="4157640" cy="1629360"/>
+            <a:ext cx="4157280" cy="1629000"/>
           </a:xfrm>
           <a:prstGeom prst="rect">
             <a:avLst/>
@@ -1802,23 +1815,23 @@
         <p:txBody>
           <a:bodyPr lIns="0" rIns="0" tIns="0" bIns="0"/>
           <a:p>
-            <a:endParaRPr b="0" lang="en-US" sz="1400" spc="-1" strike="noStrike">
-              <a:solidFill>
-                <a:srgbClr val="000000"/>
-              </a:solidFill>
-              <a:uFill>
-                <a:solidFill>
-                  <a:srgbClr val="ffffff"/>
-                </a:solidFill>
-              </a:uFill>
-              <a:latin typeface="Arial"/>
-            </a:endParaRPr>
-          </a:p>
-        </p:txBody>
-      </p:sp>
-      <p:sp>
-        <p:nvSpPr>
-          <p:cNvPr id="66" name="PlaceHolder 3"/>
+            <a:endParaRPr b="0" lang="en-US" sz="3200" spc="-1" strike="noStrike">
+              <a:solidFill>
+                <a:srgbClr val="ffffff"/>
+              </a:solidFill>
+              <a:uFill>
+                <a:solidFill>
+                  <a:srgbClr val="ffffff"/>
+                </a:solidFill>
+              </a:uFill>
+              <a:latin typeface="Arial"/>
+            </a:endParaRPr>
+          </a:p>
+        </p:txBody>
+      </p:sp>
+      <p:sp>
+        <p:nvSpPr>
+          <p:cNvPr id="64" name="PlaceHolder 3"/>
           <p:cNvSpPr>
             <a:spLocks noGrp="1"/>
           </p:cNvSpPr>
@@ -1828,8 +1841,8 @@
         </p:nvSpPr>
         <p:spPr>
           <a:xfrm>
-            <a:off x="4677840" y="1152360"/>
-            <a:ext cx="4157640" cy="1629360"/>
+            <a:off x="4677120" y="1152360"/>
+            <a:ext cx="4157280" cy="1629000"/>
           </a:xfrm>
           <a:prstGeom prst="rect">
             <a:avLst/>
@@ -1838,23 +1851,23 @@
         <p:txBody>
           <a:bodyPr lIns="0" rIns="0" tIns="0" bIns="0"/>
           <a:p>
-            <a:endParaRPr b="0" lang="en-US" sz="1400" spc="-1" strike="noStrike">
-              <a:solidFill>
-                <a:srgbClr val="000000"/>
-              </a:solidFill>
-              <a:uFill>
-                <a:solidFill>
-                  <a:srgbClr val="ffffff"/>
-                </a:solidFill>
-              </a:uFill>
-              <a:latin typeface="Arial"/>
-            </a:endParaRPr>
-          </a:p>
-        </p:txBody>
-      </p:sp>
-      <p:sp>
-        <p:nvSpPr>
-          <p:cNvPr id="67" name="PlaceHolder 4"/>
+            <a:endParaRPr b="0" lang="en-US" sz="3200" spc="-1" strike="noStrike">
+              <a:solidFill>
+                <a:srgbClr val="ffffff"/>
+              </a:solidFill>
+              <a:uFill>
+                <a:solidFill>
+                  <a:srgbClr val="ffffff"/>
+                </a:solidFill>
+              </a:uFill>
+              <a:latin typeface="Arial"/>
+            </a:endParaRPr>
+          </a:p>
+        </p:txBody>
+      </p:sp>
+      <p:sp>
+        <p:nvSpPr>
+          <p:cNvPr id="65" name="PlaceHolder 4"/>
           <p:cNvSpPr>
             <a:spLocks noGrp="1"/>
           </p:cNvSpPr>
@@ -1864,8 +1877,8 @@
         </p:nvSpPr>
         <p:spPr>
           <a:xfrm>
-            <a:off x="4677840" y="2936880"/>
-            <a:ext cx="4157640" cy="1629360"/>
+            <a:off x="4677120" y="2936520"/>
+            <a:ext cx="4157280" cy="1629000"/>
           </a:xfrm>
           <a:prstGeom prst="rect">
             <a:avLst/>
@@ -1874,23 +1887,23 @@
         <p:txBody>
           <a:bodyPr lIns="0" rIns="0" tIns="0" bIns="0"/>
           <a:p>
-            <a:endParaRPr b="0" lang="en-US" sz="1400" spc="-1" strike="noStrike">
-              <a:solidFill>
-                <a:srgbClr val="000000"/>
-              </a:solidFill>
-              <a:uFill>
-                <a:solidFill>
-                  <a:srgbClr val="ffffff"/>
-                </a:solidFill>
-              </a:uFill>
-              <a:latin typeface="Arial"/>
-            </a:endParaRPr>
-          </a:p>
-        </p:txBody>
-      </p:sp>
-      <p:sp>
-        <p:nvSpPr>
-          <p:cNvPr id="68" name="PlaceHolder 5"/>
+            <a:endParaRPr b="0" lang="en-US" sz="3200" spc="-1" strike="noStrike">
+              <a:solidFill>
+                <a:srgbClr val="ffffff"/>
+              </a:solidFill>
+              <a:uFill>
+                <a:solidFill>
+                  <a:srgbClr val="ffffff"/>
+                </a:solidFill>
+              </a:uFill>
+              <a:latin typeface="Arial"/>
+            </a:endParaRPr>
+          </a:p>
+        </p:txBody>
+      </p:sp>
+      <p:sp>
+        <p:nvSpPr>
+          <p:cNvPr id="66" name="PlaceHolder 5"/>
           <p:cNvSpPr>
             <a:spLocks noGrp="1"/>
           </p:cNvSpPr>
@@ -1900,8 +1913,8 @@
         </p:nvSpPr>
         <p:spPr>
           <a:xfrm>
-            <a:off x="311760" y="2936880"/>
-            <a:ext cx="4157640" cy="1629360"/>
+            <a:off x="311760" y="2936520"/>
+            <a:ext cx="4157280" cy="1629000"/>
           </a:xfrm>
           <a:prstGeom prst="rect">
             <a:avLst/>
@@ -1910,9 +1923,9 @@
         <p:txBody>
           <a:bodyPr lIns="0" rIns="0" tIns="0" bIns="0"/>
           <a:p>
-            <a:endParaRPr b="0" lang="en-US" sz="1400" spc="-1" strike="noStrike">
-              <a:solidFill>
-                <a:srgbClr val="000000"/>
+            <a:endParaRPr b="0" lang="en-US" sz="3200" spc="-1" strike="noStrike">
+              <a:solidFill>
+                <a:srgbClr val="ffffff"/>
               </a:solidFill>
               <a:uFill>
                 <a:solidFill>
@@ -1948,7 +1961,7 @@
       </p:grpSpPr>
       <p:sp>
         <p:nvSpPr>
-          <p:cNvPr id="69" name="PlaceHolder 1"/>
+          <p:cNvPr id="67" name="PlaceHolder 1"/>
           <p:cNvSpPr>
             <a:spLocks noGrp="1"/>
           </p:cNvSpPr>
@@ -1958,8 +1971,8 @@
         </p:nvSpPr>
         <p:spPr>
           <a:xfrm>
-            <a:off x="311760" y="444960"/>
-            <a:ext cx="8520120" cy="572400"/>
+            <a:off x="311760" y="418320"/>
+            <a:ext cx="8519760" cy="625320"/>
           </a:xfrm>
           <a:prstGeom prst="rect">
             <a:avLst/>
@@ -1968,23 +1981,24 @@
         <p:txBody>
           <a:bodyPr lIns="0" rIns="0" tIns="0" bIns="0" anchor="ctr"/>
           <a:p>
-            <a:endParaRPr b="0" lang="en-US" sz="1400" spc="-1" strike="noStrike">
-              <a:solidFill>
-                <a:srgbClr val="000000"/>
-              </a:solidFill>
-              <a:uFill>
-                <a:solidFill>
-                  <a:srgbClr val="ffffff"/>
-                </a:solidFill>
-              </a:uFill>
-              <a:latin typeface="Arial"/>
-            </a:endParaRPr>
-          </a:p>
-        </p:txBody>
-      </p:sp>
-      <p:sp>
-        <p:nvSpPr>
-          <p:cNvPr id="70" name="PlaceHolder 2"/>
+            <a:pPr algn="ctr"/>
+            <a:endParaRPr b="0" lang="en-US" sz="4400" spc="-1" strike="noStrike">
+              <a:solidFill>
+                <a:srgbClr val="ffffff"/>
+              </a:solidFill>
+              <a:uFill>
+                <a:solidFill>
+                  <a:srgbClr val="ffffff"/>
+                </a:solidFill>
+              </a:uFill>
+              <a:latin typeface="Arial"/>
+            </a:endParaRPr>
+          </a:p>
+        </p:txBody>
+      </p:sp>
+      <p:sp>
+        <p:nvSpPr>
+          <p:cNvPr id="68" name="PlaceHolder 2"/>
           <p:cNvSpPr>
             <a:spLocks noGrp="1"/>
           </p:cNvSpPr>
@@ -1995,7 +2009,7 @@
         <p:spPr>
           <a:xfrm>
             <a:off x="311760" y="1152360"/>
-            <a:ext cx="8520120" cy="3416040"/>
+            <a:ext cx="8519760" cy="3415680"/>
           </a:xfrm>
           <a:prstGeom prst="rect">
             <a:avLst/>
@@ -2004,23 +2018,23 @@
         <p:txBody>
           <a:bodyPr lIns="0" rIns="0" tIns="0" bIns="0"/>
           <a:p>
-            <a:endParaRPr b="0" lang="en-US" sz="1400" spc="-1" strike="noStrike">
-              <a:solidFill>
-                <a:srgbClr val="000000"/>
-              </a:solidFill>
-              <a:uFill>
-                <a:solidFill>
-                  <a:srgbClr val="ffffff"/>
-                </a:solidFill>
-              </a:uFill>
-              <a:latin typeface="Arial"/>
-            </a:endParaRPr>
-          </a:p>
-        </p:txBody>
-      </p:sp>
-      <p:sp>
-        <p:nvSpPr>
-          <p:cNvPr id="71" name="PlaceHolder 3"/>
+            <a:endParaRPr b="0" lang="en-US" sz="3200" spc="-1" strike="noStrike">
+              <a:solidFill>
+                <a:srgbClr val="ffffff"/>
+              </a:solidFill>
+              <a:uFill>
+                <a:solidFill>
+                  <a:srgbClr val="ffffff"/>
+                </a:solidFill>
+              </a:uFill>
+              <a:latin typeface="Arial"/>
+            </a:endParaRPr>
+          </a:p>
+        </p:txBody>
+      </p:sp>
+      <p:sp>
+        <p:nvSpPr>
+          <p:cNvPr id="69" name="PlaceHolder 3"/>
           <p:cNvSpPr>
             <a:spLocks noGrp="1"/>
           </p:cNvSpPr>
@@ -2031,7 +2045,7 @@
         <p:spPr>
           <a:xfrm>
             <a:off x="311760" y="1152360"/>
-            <a:ext cx="8520120" cy="3416040"/>
+            <a:ext cx="8519760" cy="3415680"/>
           </a:xfrm>
           <a:prstGeom prst="rect">
             <a:avLst/>
@@ -2040,9 +2054,9 @@
         <p:txBody>
           <a:bodyPr lIns="0" rIns="0" tIns="0" bIns="0"/>
           <a:p>
-            <a:endParaRPr b="0" lang="en-US" sz="1400" spc="-1" strike="noStrike">
-              <a:solidFill>
-                <a:srgbClr val="000000"/>
+            <a:endParaRPr b="0" lang="en-US" sz="3200" spc="-1" strike="noStrike">
+              <a:solidFill>
+                <a:srgbClr val="ffffff"/>
               </a:solidFill>
               <a:uFill>
                 <a:solidFill>
@@ -2056,7 +2070,7 @@
       </p:sp>
       <p:pic>
         <p:nvPicPr>
-          <p:cNvPr id="72" name="" descr=""/>
+          <p:cNvPr id="70" name="" descr=""/>
           <p:cNvPicPr/>
           <p:nvPr/>
         </p:nvPicPr>
@@ -2066,8 +2080,8 @@
         </p:blipFill>
         <p:spPr>
           <a:xfrm>
-            <a:off x="2430720" y="1152000"/>
-            <a:ext cx="4281480" cy="3416040"/>
+            <a:off x="2431080" y="1152360"/>
+            <a:ext cx="4280760" cy="3415680"/>
           </a:xfrm>
           <a:prstGeom prst="rect">
             <a:avLst/>
@@ -2079,7 +2093,7 @@
       </p:pic>
       <p:pic>
         <p:nvPicPr>
-          <p:cNvPr id="73" name="" descr=""/>
+          <p:cNvPr id="71" name="" descr=""/>
           <p:cNvPicPr/>
           <p:nvPr/>
         </p:nvPicPr>
@@ -2089,8 +2103,8 @@
         </p:blipFill>
         <p:spPr>
           <a:xfrm>
-            <a:off x="2430720" y="1152000"/>
-            <a:ext cx="4281480" cy="3416040"/>
+            <a:off x="2431080" y="1152360"/>
+            <a:ext cx="4280760" cy="3415680"/>
           </a:xfrm>
           <a:prstGeom prst="rect">
             <a:avLst/>
@@ -2124,7 +2138,7 @@
       </p:grpSpPr>
       <p:sp>
         <p:nvSpPr>
-          <p:cNvPr id="5" name="PlaceHolder 1"/>
+          <p:cNvPr id="4" name="PlaceHolder 1"/>
           <p:cNvSpPr>
             <a:spLocks noGrp="1"/>
           </p:cNvSpPr>
@@ -2134,8 +2148,8 @@
         </p:nvSpPr>
         <p:spPr>
           <a:xfrm>
-            <a:off x="311760" y="444960"/>
-            <a:ext cx="8520120" cy="572400"/>
+            <a:off x="311760" y="418320"/>
+            <a:ext cx="8519760" cy="625320"/>
           </a:xfrm>
           <a:prstGeom prst="rect">
             <a:avLst/>
@@ -2144,23 +2158,24 @@
         <p:txBody>
           <a:bodyPr lIns="0" rIns="0" tIns="0" bIns="0" anchor="ctr"/>
           <a:p>
-            <a:endParaRPr b="0" lang="en-US" sz="1400" spc="-1" strike="noStrike">
-              <a:solidFill>
-                <a:srgbClr val="000000"/>
-              </a:solidFill>
-              <a:uFill>
-                <a:solidFill>
-                  <a:srgbClr val="ffffff"/>
-                </a:solidFill>
-              </a:uFill>
-              <a:latin typeface="Arial"/>
-            </a:endParaRPr>
-          </a:p>
-        </p:txBody>
-      </p:sp>
-      <p:sp>
-        <p:nvSpPr>
-          <p:cNvPr id="6" name="PlaceHolder 2"/>
+            <a:pPr algn="ctr"/>
+            <a:endParaRPr b="0" lang="en-US" sz="4400" spc="-1" strike="noStrike">
+              <a:solidFill>
+                <a:srgbClr val="ffffff"/>
+              </a:solidFill>
+              <a:uFill>
+                <a:solidFill>
+                  <a:srgbClr val="ffffff"/>
+                </a:solidFill>
+              </a:uFill>
+              <a:latin typeface="Arial"/>
+            </a:endParaRPr>
+          </a:p>
+        </p:txBody>
+      </p:sp>
+      <p:sp>
+        <p:nvSpPr>
+          <p:cNvPr id="5" name="PlaceHolder 2"/>
           <p:cNvSpPr>
             <a:spLocks noGrp="1"/>
           </p:cNvSpPr>
@@ -2171,7 +2186,7 @@
         <p:spPr>
           <a:xfrm>
             <a:off x="311760" y="1152360"/>
-            <a:ext cx="8520120" cy="3416040"/>
+            <a:ext cx="8519760" cy="3415680"/>
           </a:xfrm>
           <a:prstGeom prst="rect">
             <a:avLst/>
@@ -2180,9 +2195,9 @@
         <p:txBody>
           <a:bodyPr lIns="0" rIns="0" tIns="0" bIns="0"/>
           <a:p>
-            <a:endParaRPr b="0" lang="en-US" sz="1400" spc="-1" strike="noStrike">
-              <a:solidFill>
-                <a:srgbClr val="000000"/>
+            <a:endParaRPr b="0" lang="en-US" sz="3200" spc="-1" strike="noStrike">
+              <a:solidFill>
+                <a:srgbClr val="ffffff"/>
               </a:solidFill>
               <a:uFill>
                 <a:solidFill>
@@ -2218,7 +2233,7 @@
       </p:grpSpPr>
       <p:sp>
         <p:nvSpPr>
-          <p:cNvPr id="7" name="PlaceHolder 1"/>
+          <p:cNvPr id="6" name="PlaceHolder 1"/>
           <p:cNvSpPr>
             <a:spLocks noGrp="1"/>
           </p:cNvSpPr>
@@ -2228,8 +2243,8 @@
         </p:nvSpPr>
         <p:spPr>
           <a:xfrm>
-            <a:off x="311760" y="444960"/>
-            <a:ext cx="8520120" cy="572400"/>
+            <a:off x="311760" y="418320"/>
+            <a:ext cx="8519760" cy="625320"/>
           </a:xfrm>
           <a:prstGeom prst="rect">
             <a:avLst/>
@@ -2238,23 +2253,24 @@
         <p:txBody>
           <a:bodyPr lIns="0" rIns="0" tIns="0" bIns="0" anchor="ctr"/>
           <a:p>
-            <a:endParaRPr b="0" lang="en-US" sz="1400" spc="-1" strike="noStrike">
-              <a:solidFill>
-                <a:srgbClr val="000000"/>
-              </a:solidFill>
-              <a:uFill>
-                <a:solidFill>
-                  <a:srgbClr val="ffffff"/>
-                </a:solidFill>
-              </a:uFill>
-              <a:latin typeface="Arial"/>
-            </a:endParaRPr>
-          </a:p>
-        </p:txBody>
-      </p:sp>
-      <p:sp>
-        <p:nvSpPr>
-          <p:cNvPr id="8" name="PlaceHolder 2"/>
+            <a:pPr algn="ctr"/>
+            <a:endParaRPr b="0" lang="en-US" sz="4400" spc="-1" strike="noStrike">
+              <a:solidFill>
+                <a:srgbClr val="ffffff"/>
+              </a:solidFill>
+              <a:uFill>
+                <a:solidFill>
+                  <a:srgbClr val="ffffff"/>
+                </a:solidFill>
+              </a:uFill>
+              <a:latin typeface="Arial"/>
+            </a:endParaRPr>
+          </a:p>
+        </p:txBody>
+      </p:sp>
+      <p:sp>
+        <p:nvSpPr>
+          <p:cNvPr id="7" name="PlaceHolder 2"/>
           <p:cNvSpPr>
             <a:spLocks noGrp="1"/>
           </p:cNvSpPr>
@@ -2265,7 +2281,7 @@
         <p:spPr>
           <a:xfrm>
             <a:off x="311760" y="1152360"/>
-            <a:ext cx="4157640" cy="3416040"/>
+            <a:ext cx="4157280" cy="3415680"/>
           </a:xfrm>
           <a:prstGeom prst="rect">
             <a:avLst/>
@@ -2274,23 +2290,23 @@
         <p:txBody>
           <a:bodyPr lIns="0" rIns="0" tIns="0" bIns="0"/>
           <a:p>
-            <a:endParaRPr b="0" lang="en-US" sz="1400" spc="-1" strike="noStrike">
-              <a:solidFill>
-                <a:srgbClr val="000000"/>
-              </a:solidFill>
-              <a:uFill>
-                <a:solidFill>
-                  <a:srgbClr val="ffffff"/>
-                </a:solidFill>
-              </a:uFill>
-              <a:latin typeface="Arial"/>
-            </a:endParaRPr>
-          </a:p>
-        </p:txBody>
-      </p:sp>
-      <p:sp>
-        <p:nvSpPr>
-          <p:cNvPr id="9" name="PlaceHolder 3"/>
+            <a:endParaRPr b="0" lang="en-US" sz="3200" spc="-1" strike="noStrike">
+              <a:solidFill>
+                <a:srgbClr val="ffffff"/>
+              </a:solidFill>
+              <a:uFill>
+                <a:solidFill>
+                  <a:srgbClr val="ffffff"/>
+                </a:solidFill>
+              </a:uFill>
+              <a:latin typeface="Arial"/>
+            </a:endParaRPr>
+          </a:p>
+        </p:txBody>
+      </p:sp>
+      <p:sp>
+        <p:nvSpPr>
+          <p:cNvPr id="8" name="PlaceHolder 3"/>
           <p:cNvSpPr>
             <a:spLocks noGrp="1"/>
           </p:cNvSpPr>
@@ -2300,8 +2316,8 @@
         </p:nvSpPr>
         <p:spPr>
           <a:xfrm>
-            <a:off x="4677840" y="1152360"/>
-            <a:ext cx="4157640" cy="3416040"/>
+            <a:off x="4677120" y="1152360"/>
+            <a:ext cx="4157280" cy="3415680"/>
           </a:xfrm>
           <a:prstGeom prst="rect">
             <a:avLst/>
@@ -2310,9 +2326,9 @@
         <p:txBody>
           <a:bodyPr lIns="0" rIns="0" tIns="0" bIns="0"/>
           <a:p>
-            <a:endParaRPr b="0" lang="en-US" sz="1400" spc="-1" strike="noStrike">
-              <a:solidFill>
-                <a:srgbClr val="000000"/>
+            <a:endParaRPr b="0" lang="en-US" sz="3200" spc="-1" strike="noStrike">
+              <a:solidFill>
+                <a:srgbClr val="ffffff"/>
               </a:solidFill>
               <a:uFill>
                 <a:solidFill>
@@ -2348,7 +2364,7 @@
       </p:grpSpPr>
       <p:sp>
         <p:nvSpPr>
-          <p:cNvPr id="10" name="PlaceHolder 1"/>
+          <p:cNvPr id="9" name="PlaceHolder 1"/>
           <p:cNvSpPr>
             <a:spLocks noGrp="1"/>
           </p:cNvSpPr>
@@ -2358,8 +2374,8 @@
         </p:nvSpPr>
         <p:spPr>
           <a:xfrm>
-            <a:off x="311760" y="444960"/>
-            <a:ext cx="8520120" cy="572400"/>
+            <a:off x="311760" y="418320"/>
+            <a:ext cx="8519760" cy="625320"/>
           </a:xfrm>
           <a:prstGeom prst="rect">
             <a:avLst/>
@@ -2368,9 +2384,10 @@
         <p:txBody>
           <a:bodyPr lIns="0" rIns="0" tIns="0" bIns="0" anchor="ctr"/>
           <a:p>
-            <a:endParaRPr b="0" lang="en-US" sz="1400" spc="-1" strike="noStrike">
-              <a:solidFill>
-                <a:srgbClr val="000000"/>
+            <a:pPr algn="ctr"/>
+            <a:endParaRPr b="0" lang="en-US" sz="4400" spc="-1" strike="noStrike">
+              <a:solidFill>
+                <a:srgbClr val="ffffff"/>
               </a:solidFill>
               <a:uFill>
                 <a:solidFill>
@@ -2406,7 +2423,7 @@
       </p:grpSpPr>
       <p:sp>
         <p:nvSpPr>
-          <p:cNvPr id="11" name="PlaceHolder 1"/>
+          <p:cNvPr id="10" name="PlaceHolder 1"/>
           <p:cNvSpPr>
             <a:spLocks noGrp="1"/>
           </p:cNvSpPr>
@@ -2417,7 +2434,7 @@
         <p:spPr>
           <a:xfrm>
             <a:off x="311760" y="444960"/>
-            <a:ext cx="8520120" cy="2654640"/>
+            <a:ext cx="8519760" cy="2652840"/>
           </a:xfrm>
           <a:prstGeom prst="rect">
             <a:avLst/>
@@ -2465,7 +2482,7 @@
       </p:grpSpPr>
       <p:sp>
         <p:nvSpPr>
-          <p:cNvPr id="12" name="PlaceHolder 1"/>
+          <p:cNvPr id="11" name="PlaceHolder 1"/>
           <p:cNvSpPr>
             <a:spLocks noGrp="1"/>
           </p:cNvSpPr>
@@ -2475,8 +2492,8 @@
         </p:nvSpPr>
         <p:spPr>
           <a:xfrm>
-            <a:off x="311760" y="444960"/>
-            <a:ext cx="8520120" cy="572400"/>
+            <a:off x="311760" y="418320"/>
+            <a:ext cx="8519760" cy="625320"/>
           </a:xfrm>
           <a:prstGeom prst="rect">
             <a:avLst/>
@@ -2485,23 +2502,24 @@
         <p:txBody>
           <a:bodyPr lIns="0" rIns="0" tIns="0" bIns="0" anchor="ctr"/>
           <a:p>
-            <a:endParaRPr b="0" lang="en-US" sz="1400" spc="-1" strike="noStrike">
-              <a:solidFill>
-                <a:srgbClr val="000000"/>
-              </a:solidFill>
-              <a:uFill>
-                <a:solidFill>
-                  <a:srgbClr val="ffffff"/>
-                </a:solidFill>
-              </a:uFill>
-              <a:latin typeface="Arial"/>
-            </a:endParaRPr>
-          </a:p>
-        </p:txBody>
-      </p:sp>
-      <p:sp>
-        <p:nvSpPr>
-          <p:cNvPr id="13" name="PlaceHolder 2"/>
+            <a:pPr algn="ctr"/>
+            <a:endParaRPr b="0" lang="en-US" sz="4400" spc="-1" strike="noStrike">
+              <a:solidFill>
+                <a:srgbClr val="ffffff"/>
+              </a:solidFill>
+              <a:uFill>
+                <a:solidFill>
+                  <a:srgbClr val="ffffff"/>
+                </a:solidFill>
+              </a:uFill>
+              <a:latin typeface="Arial"/>
+            </a:endParaRPr>
+          </a:p>
+        </p:txBody>
+      </p:sp>
+      <p:sp>
+        <p:nvSpPr>
+          <p:cNvPr id="12" name="PlaceHolder 2"/>
           <p:cNvSpPr>
             <a:spLocks noGrp="1"/>
           </p:cNvSpPr>
@@ -2512,7 +2530,7 @@
         <p:spPr>
           <a:xfrm>
             <a:off x="311760" y="1152360"/>
-            <a:ext cx="4157640" cy="1629360"/>
+            <a:ext cx="4157280" cy="1629000"/>
           </a:xfrm>
           <a:prstGeom prst="rect">
             <a:avLst/>
@@ -2521,23 +2539,23 @@
         <p:txBody>
           <a:bodyPr lIns="0" rIns="0" tIns="0" bIns="0"/>
           <a:p>
-            <a:endParaRPr b="0" lang="en-US" sz="1400" spc="-1" strike="noStrike">
-              <a:solidFill>
-                <a:srgbClr val="000000"/>
-              </a:solidFill>
-              <a:uFill>
-                <a:solidFill>
-                  <a:srgbClr val="ffffff"/>
-                </a:solidFill>
-              </a:uFill>
-              <a:latin typeface="Arial"/>
-            </a:endParaRPr>
-          </a:p>
-        </p:txBody>
-      </p:sp>
-      <p:sp>
-        <p:nvSpPr>
-          <p:cNvPr id="14" name="PlaceHolder 3"/>
+            <a:endParaRPr b="0" lang="en-US" sz="3200" spc="-1" strike="noStrike">
+              <a:solidFill>
+                <a:srgbClr val="ffffff"/>
+              </a:solidFill>
+              <a:uFill>
+                <a:solidFill>
+                  <a:srgbClr val="ffffff"/>
+                </a:solidFill>
+              </a:uFill>
+              <a:latin typeface="Arial"/>
+            </a:endParaRPr>
+          </a:p>
+        </p:txBody>
+      </p:sp>
+      <p:sp>
+        <p:nvSpPr>
+          <p:cNvPr id="13" name="PlaceHolder 3"/>
           <p:cNvSpPr>
             <a:spLocks noGrp="1"/>
           </p:cNvSpPr>
@@ -2547,8 +2565,8 @@
         </p:nvSpPr>
         <p:spPr>
           <a:xfrm>
-            <a:off x="311760" y="2936880"/>
-            <a:ext cx="4157640" cy="1629360"/>
+            <a:off x="311760" y="2936520"/>
+            <a:ext cx="4157280" cy="1629000"/>
           </a:xfrm>
           <a:prstGeom prst="rect">
             <a:avLst/>
@@ -2557,23 +2575,23 @@
         <p:txBody>
           <a:bodyPr lIns="0" rIns="0" tIns="0" bIns="0"/>
           <a:p>
-            <a:endParaRPr b="0" lang="en-US" sz="1400" spc="-1" strike="noStrike">
-              <a:solidFill>
-                <a:srgbClr val="000000"/>
-              </a:solidFill>
-              <a:uFill>
-                <a:solidFill>
-                  <a:srgbClr val="ffffff"/>
-                </a:solidFill>
-              </a:uFill>
-              <a:latin typeface="Arial"/>
-            </a:endParaRPr>
-          </a:p>
-        </p:txBody>
-      </p:sp>
-      <p:sp>
-        <p:nvSpPr>
-          <p:cNvPr id="15" name="PlaceHolder 4"/>
+            <a:endParaRPr b="0" lang="en-US" sz="3200" spc="-1" strike="noStrike">
+              <a:solidFill>
+                <a:srgbClr val="ffffff"/>
+              </a:solidFill>
+              <a:uFill>
+                <a:solidFill>
+                  <a:srgbClr val="ffffff"/>
+                </a:solidFill>
+              </a:uFill>
+              <a:latin typeface="Arial"/>
+            </a:endParaRPr>
+          </a:p>
+        </p:txBody>
+      </p:sp>
+      <p:sp>
+        <p:nvSpPr>
+          <p:cNvPr id="14" name="PlaceHolder 4"/>
           <p:cNvSpPr>
             <a:spLocks noGrp="1"/>
           </p:cNvSpPr>
@@ -2583,8 +2601,8 @@
         </p:nvSpPr>
         <p:spPr>
           <a:xfrm>
-            <a:off x="4677840" y="1152360"/>
-            <a:ext cx="4157640" cy="3416040"/>
+            <a:off x="4677120" y="1152360"/>
+            <a:ext cx="4157280" cy="3415680"/>
           </a:xfrm>
           <a:prstGeom prst="rect">
             <a:avLst/>
@@ -2593,9 +2611,9 @@
         <p:txBody>
           <a:bodyPr lIns="0" rIns="0" tIns="0" bIns="0"/>
           <a:p>
-            <a:endParaRPr b="0" lang="en-US" sz="1400" spc="-1" strike="noStrike">
-              <a:solidFill>
-                <a:srgbClr val="000000"/>
+            <a:endParaRPr b="0" lang="en-US" sz="3200" spc="-1" strike="noStrike">
+              <a:solidFill>
+                <a:srgbClr val="ffffff"/>
               </a:solidFill>
               <a:uFill>
                 <a:solidFill>
@@ -2631,7 +2649,7 @@
       </p:grpSpPr>
       <p:sp>
         <p:nvSpPr>
-          <p:cNvPr id="16" name="PlaceHolder 1"/>
+          <p:cNvPr id="15" name="PlaceHolder 1"/>
           <p:cNvSpPr>
             <a:spLocks noGrp="1"/>
           </p:cNvSpPr>
@@ -2641,8 +2659,8 @@
         </p:nvSpPr>
         <p:spPr>
           <a:xfrm>
-            <a:off x="311760" y="444960"/>
-            <a:ext cx="8520120" cy="572400"/>
+            <a:off x="311760" y="418320"/>
+            <a:ext cx="8519760" cy="625320"/>
           </a:xfrm>
           <a:prstGeom prst="rect">
             <a:avLst/>
@@ -2651,23 +2669,24 @@
         <p:txBody>
           <a:bodyPr lIns="0" rIns="0" tIns="0" bIns="0" anchor="ctr"/>
           <a:p>
-            <a:endParaRPr b="0" lang="en-US" sz="1400" spc="-1" strike="noStrike">
-              <a:solidFill>
-                <a:srgbClr val="000000"/>
-              </a:solidFill>
-              <a:uFill>
-                <a:solidFill>
-                  <a:srgbClr val="ffffff"/>
-                </a:solidFill>
-              </a:uFill>
-              <a:latin typeface="Arial"/>
-            </a:endParaRPr>
-          </a:p>
-        </p:txBody>
-      </p:sp>
-      <p:sp>
-        <p:nvSpPr>
-          <p:cNvPr id="17" name="PlaceHolder 2"/>
+            <a:pPr algn="ctr"/>
+            <a:endParaRPr b="0" lang="en-US" sz="4400" spc="-1" strike="noStrike">
+              <a:solidFill>
+                <a:srgbClr val="ffffff"/>
+              </a:solidFill>
+              <a:uFill>
+                <a:solidFill>
+                  <a:srgbClr val="ffffff"/>
+                </a:solidFill>
+              </a:uFill>
+              <a:latin typeface="Arial"/>
+            </a:endParaRPr>
+          </a:p>
+        </p:txBody>
+      </p:sp>
+      <p:sp>
+        <p:nvSpPr>
+          <p:cNvPr id="16" name="PlaceHolder 2"/>
           <p:cNvSpPr>
             <a:spLocks noGrp="1"/>
           </p:cNvSpPr>
@@ -2678,7 +2697,7 @@
         <p:spPr>
           <a:xfrm>
             <a:off x="311760" y="1152360"/>
-            <a:ext cx="4157640" cy="3416040"/>
+            <a:ext cx="4157280" cy="3415680"/>
           </a:xfrm>
           <a:prstGeom prst="rect">
             <a:avLst/>
@@ -2687,23 +2706,23 @@
         <p:txBody>
           <a:bodyPr lIns="0" rIns="0" tIns="0" bIns="0"/>
           <a:p>
-            <a:endParaRPr b="0" lang="en-US" sz="1400" spc="-1" strike="noStrike">
-              <a:solidFill>
-                <a:srgbClr val="000000"/>
-              </a:solidFill>
-              <a:uFill>
-                <a:solidFill>
-                  <a:srgbClr val="ffffff"/>
-                </a:solidFill>
-              </a:uFill>
-              <a:latin typeface="Arial"/>
-            </a:endParaRPr>
-          </a:p>
-        </p:txBody>
-      </p:sp>
-      <p:sp>
-        <p:nvSpPr>
-          <p:cNvPr id="18" name="PlaceHolder 3"/>
+            <a:endParaRPr b="0" lang="en-US" sz="3200" spc="-1" strike="noStrike">
+              <a:solidFill>
+                <a:srgbClr val="ffffff"/>
+              </a:solidFill>
+              <a:uFill>
+                <a:solidFill>
+                  <a:srgbClr val="ffffff"/>
+                </a:solidFill>
+              </a:uFill>
+              <a:latin typeface="Arial"/>
+            </a:endParaRPr>
+          </a:p>
+        </p:txBody>
+      </p:sp>
+      <p:sp>
+        <p:nvSpPr>
+          <p:cNvPr id="17" name="PlaceHolder 3"/>
           <p:cNvSpPr>
             <a:spLocks noGrp="1"/>
           </p:cNvSpPr>
@@ -2713,8 +2732,8 @@
         </p:nvSpPr>
         <p:spPr>
           <a:xfrm>
-            <a:off x="4677840" y="1152360"/>
-            <a:ext cx="4157640" cy="1629360"/>
+            <a:off x="4677120" y="1152360"/>
+            <a:ext cx="4157280" cy="1629000"/>
           </a:xfrm>
           <a:prstGeom prst="rect">
             <a:avLst/>
@@ -2723,23 +2742,23 @@
         <p:txBody>
           <a:bodyPr lIns="0" rIns="0" tIns="0" bIns="0"/>
           <a:p>
-            <a:endParaRPr b="0" lang="en-US" sz="1400" spc="-1" strike="noStrike">
-              <a:solidFill>
-                <a:srgbClr val="000000"/>
-              </a:solidFill>
-              <a:uFill>
-                <a:solidFill>
-                  <a:srgbClr val="ffffff"/>
-                </a:solidFill>
-              </a:uFill>
-              <a:latin typeface="Arial"/>
-            </a:endParaRPr>
-          </a:p>
-        </p:txBody>
-      </p:sp>
-      <p:sp>
-        <p:nvSpPr>
-          <p:cNvPr id="19" name="PlaceHolder 4"/>
+            <a:endParaRPr b="0" lang="en-US" sz="3200" spc="-1" strike="noStrike">
+              <a:solidFill>
+                <a:srgbClr val="ffffff"/>
+              </a:solidFill>
+              <a:uFill>
+                <a:solidFill>
+                  <a:srgbClr val="ffffff"/>
+                </a:solidFill>
+              </a:uFill>
+              <a:latin typeface="Arial"/>
+            </a:endParaRPr>
+          </a:p>
+        </p:txBody>
+      </p:sp>
+      <p:sp>
+        <p:nvSpPr>
+          <p:cNvPr id="18" name="PlaceHolder 4"/>
           <p:cNvSpPr>
             <a:spLocks noGrp="1"/>
           </p:cNvSpPr>
@@ -2749,8 +2768,8 @@
         </p:nvSpPr>
         <p:spPr>
           <a:xfrm>
-            <a:off x="4677840" y="2936880"/>
-            <a:ext cx="4157640" cy="1629360"/>
+            <a:off x="4677120" y="2936520"/>
+            <a:ext cx="4157280" cy="1629000"/>
           </a:xfrm>
           <a:prstGeom prst="rect">
             <a:avLst/>
@@ -2759,9 +2778,9 @@
         <p:txBody>
           <a:bodyPr lIns="0" rIns="0" tIns="0" bIns="0"/>
           <a:p>
-            <a:endParaRPr b="0" lang="en-US" sz="1400" spc="-1" strike="noStrike">
-              <a:solidFill>
-                <a:srgbClr val="000000"/>
+            <a:endParaRPr b="0" lang="en-US" sz="3200" spc="-1" strike="noStrike">
+              <a:solidFill>
+                <a:srgbClr val="ffffff"/>
               </a:solidFill>
               <a:uFill>
                 <a:solidFill>
@@ -2797,7 +2816,7 @@
       </p:grpSpPr>
       <p:sp>
         <p:nvSpPr>
-          <p:cNvPr id="20" name="PlaceHolder 1"/>
+          <p:cNvPr id="19" name="PlaceHolder 1"/>
           <p:cNvSpPr>
             <a:spLocks noGrp="1"/>
           </p:cNvSpPr>
@@ -2807,8 +2826,8 @@
         </p:nvSpPr>
         <p:spPr>
           <a:xfrm>
-            <a:off x="311760" y="444960"/>
-            <a:ext cx="8520120" cy="572400"/>
+            <a:off x="311760" y="418320"/>
+            <a:ext cx="8519760" cy="625320"/>
           </a:xfrm>
           <a:prstGeom prst="rect">
             <a:avLst/>
@@ -2817,23 +2836,24 @@
         <p:txBody>
           <a:bodyPr lIns="0" rIns="0" tIns="0" bIns="0" anchor="ctr"/>
           <a:p>
-            <a:endParaRPr b="0" lang="en-US" sz="1400" spc="-1" strike="noStrike">
-              <a:solidFill>
-                <a:srgbClr val="000000"/>
-              </a:solidFill>
-              <a:uFill>
-                <a:solidFill>
-                  <a:srgbClr val="ffffff"/>
-                </a:solidFill>
-              </a:uFill>
-              <a:latin typeface="Arial"/>
-            </a:endParaRPr>
-          </a:p>
-        </p:txBody>
-      </p:sp>
-      <p:sp>
-        <p:nvSpPr>
-          <p:cNvPr id="21" name="PlaceHolder 2"/>
+            <a:pPr algn="ctr"/>
+            <a:endParaRPr b="0" lang="en-US" sz="4400" spc="-1" strike="noStrike">
+              <a:solidFill>
+                <a:srgbClr val="ffffff"/>
+              </a:solidFill>
+              <a:uFill>
+                <a:solidFill>
+                  <a:srgbClr val="ffffff"/>
+                </a:solidFill>
+              </a:uFill>
+              <a:latin typeface="Arial"/>
+            </a:endParaRPr>
+          </a:p>
+        </p:txBody>
+      </p:sp>
+      <p:sp>
+        <p:nvSpPr>
+          <p:cNvPr id="20" name="PlaceHolder 2"/>
           <p:cNvSpPr>
             <a:spLocks noGrp="1"/>
           </p:cNvSpPr>
@@ -2844,7 +2864,7 @@
         <p:spPr>
           <a:xfrm>
             <a:off x="311760" y="1152360"/>
-            <a:ext cx="4157640" cy="1629360"/>
+            <a:ext cx="4157280" cy="1629000"/>
           </a:xfrm>
           <a:prstGeom prst="rect">
             <a:avLst/>
@@ -2853,23 +2873,23 @@
         <p:txBody>
           <a:bodyPr lIns="0" rIns="0" tIns="0" bIns="0"/>
           <a:p>
-            <a:endParaRPr b="0" lang="en-US" sz="1400" spc="-1" strike="noStrike">
-              <a:solidFill>
-                <a:srgbClr val="000000"/>
-              </a:solidFill>
-              <a:uFill>
-                <a:solidFill>
-                  <a:srgbClr val="ffffff"/>
-                </a:solidFill>
-              </a:uFill>
-              <a:latin typeface="Arial"/>
-            </a:endParaRPr>
-          </a:p>
-        </p:txBody>
-      </p:sp>
-      <p:sp>
-        <p:nvSpPr>
-          <p:cNvPr id="22" name="PlaceHolder 3"/>
+            <a:endParaRPr b="0" lang="en-US" sz="3200" spc="-1" strike="noStrike">
+              <a:solidFill>
+                <a:srgbClr val="ffffff"/>
+              </a:solidFill>
+              <a:uFill>
+                <a:solidFill>
+                  <a:srgbClr val="ffffff"/>
+                </a:solidFill>
+              </a:uFill>
+              <a:latin typeface="Arial"/>
+            </a:endParaRPr>
+          </a:p>
+        </p:txBody>
+      </p:sp>
+      <p:sp>
+        <p:nvSpPr>
+          <p:cNvPr id="21" name="PlaceHolder 3"/>
           <p:cNvSpPr>
             <a:spLocks noGrp="1"/>
           </p:cNvSpPr>
@@ -2879,8 +2899,8 @@
         </p:nvSpPr>
         <p:spPr>
           <a:xfrm>
-            <a:off x="4677840" y="1152360"/>
-            <a:ext cx="4157640" cy="1629360"/>
+            <a:off x="4677120" y="1152360"/>
+            <a:ext cx="4157280" cy="1629000"/>
           </a:xfrm>
           <a:prstGeom prst="rect">
             <a:avLst/>
@@ -2889,23 +2909,23 @@
         <p:txBody>
           <a:bodyPr lIns="0" rIns="0" tIns="0" bIns="0"/>
           <a:p>
-            <a:endParaRPr b="0" lang="en-US" sz="1400" spc="-1" strike="noStrike">
-              <a:solidFill>
-                <a:srgbClr val="000000"/>
-              </a:solidFill>
-              <a:uFill>
-                <a:solidFill>
-                  <a:srgbClr val="ffffff"/>
-                </a:solidFill>
-              </a:uFill>
-              <a:latin typeface="Arial"/>
-            </a:endParaRPr>
-          </a:p>
-        </p:txBody>
-      </p:sp>
-      <p:sp>
-        <p:nvSpPr>
-          <p:cNvPr id="23" name="PlaceHolder 4"/>
+            <a:endParaRPr b="0" lang="en-US" sz="3200" spc="-1" strike="noStrike">
+              <a:solidFill>
+                <a:srgbClr val="ffffff"/>
+              </a:solidFill>
+              <a:uFill>
+                <a:solidFill>
+                  <a:srgbClr val="ffffff"/>
+                </a:solidFill>
+              </a:uFill>
+              <a:latin typeface="Arial"/>
+            </a:endParaRPr>
+          </a:p>
+        </p:txBody>
+      </p:sp>
+      <p:sp>
+        <p:nvSpPr>
+          <p:cNvPr id="22" name="PlaceHolder 4"/>
           <p:cNvSpPr>
             <a:spLocks noGrp="1"/>
           </p:cNvSpPr>
@@ -2915,8 +2935,8 @@
         </p:nvSpPr>
         <p:spPr>
           <a:xfrm>
-            <a:off x="311760" y="2936880"/>
-            <a:ext cx="8520120" cy="1629360"/>
+            <a:off x="311760" y="2936520"/>
+            <a:ext cx="8519760" cy="1629000"/>
           </a:xfrm>
           <a:prstGeom prst="rect">
             <a:avLst/>
@@ -2925,9 +2945,9 @@
         <p:txBody>
           <a:bodyPr lIns="0" rIns="0" tIns="0" bIns="0"/>
           <a:p>
-            <a:endParaRPr b="0" lang="en-US" sz="1400" spc="-1" strike="noStrike">
-              <a:solidFill>
-                <a:srgbClr val="000000"/>
+            <a:endParaRPr b="0" lang="en-US" sz="3200" spc="-1" strike="noStrike">
+              <a:solidFill>
+                <a:srgbClr val="ffffff"/>
               </a:solidFill>
               <a:uFill>
                 <a:solidFill>
@@ -2980,19 +3000,20 @@
         </p:nvSpPr>
         <p:spPr>
           <a:xfrm>
-            <a:off x="311760" y="744480"/>
-            <a:ext cx="8520120" cy="2052360"/>
-          </a:xfrm>
-          <a:prstGeom prst="rect">
-            <a:avLst/>
-          </a:prstGeom>
-        </p:spPr>
-        <p:txBody>
-          <a:bodyPr tIns="91440" bIns="91440" anchor="b"/>
-          <a:p>
-            <a:endParaRPr b="0" lang="en-US" sz="1400" spc="-1" strike="noStrike">
-              <a:solidFill>
-                <a:srgbClr val="000000"/>
+            <a:off x="311760" y="444960"/>
+            <a:ext cx="8519760" cy="572040"/>
+          </a:xfrm>
+          <a:prstGeom prst="rect">
+            <a:avLst/>
+          </a:prstGeom>
+        </p:spPr>
+        <p:txBody>
+          <a:bodyPr lIns="0" rIns="0" tIns="0" bIns="0" anchor="ctr"/>
+          <a:p>
+            <a:pPr algn="ctr"/>
+            <a:endParaRPr b="0" lang="en-US" sz="4400" spc="-1" strike="noStrike">
+              <a:solidFill>
+                <a:srgbClr val="ffffff"/>
               </a:solidFill>
               <a:uFill>
                 <a:solidFill>
@@ -3007,62 +3028,6 @@
       <p:sp>
         <p:nvSpPr>
           <p:cNvPr id="1" name="PlaceHolder 2"/>
-          <p:cNvSpPr>
-            <a:spLocks noGrp="1"/>
-          </p:cNvSpPr>
-          <p:nvPr>
-            <p:ph type="sldNum"/>
-          </p:nvPr>
-        </p:nvSpPr>
-        <p:spPr>
-          <a:xfrm>
-            <a:off x="8472600" y="4663080"/>
-            <a:ext cx="548280" cy="393120"/>
-          </a:xfrm>
-          <a:prstGeom prst="rect">
-            <a:avLst/>
-          </a:prstGeom>
-        </p:spPr>
-        <p:txBody>
-          <a:bodyPr tIns="91440" bIns="91440" anchor="ctr"/>
-          <a:p>
-            <a:pPr algn="r">
-              <a:lnSpc>
-                <a:spcPct val="100000"/>
-              </a:lnSpc>
-            </a:pPr>
-            <a:fld id="{60BE29A4-19AD-457A-AD73-C5938A95077B}" type="slidenum">
-              <a:rPr b="0" lang="en-US" sz="1000" spc="-1" strike="noStrike">
-                <a:solidFill>
-                  <a:srgbClr val="adadad"/>
-                </a:solidFill>
-                <a:uFill>
-                  <a:solidFill>
-                    <a:srgbClr val="ffffff"/>
-                  </a:solidFill>
-                </a:uFill>
-                <a:latin typeface="Arial"/>
-                <a:ea typeface="Arial"/>
-              </a:rPr>
-              <a:t>&lt;number&gt;</a:t>
-            </a:fld>
-            <a:endParaRPr b="0" lang="en-US" sz="1400" spc="-1" strike="noStrike">
-              <a:solidFill>
-                <a:srgbClr val="ffffff"/>
-              </a:solidFill>
-              <a:uFill>
-                <a:solidFill>
-                  <a:srgbClr val="ffffff"/>
-                </a:solidFill>
-              </a:uFill>
-              <a:latin typeface="Times New Roman"/>
-            </a:endParaRPr>
-          </a:p>
-        </p:txBody>
-      </p:sp>
-      <p:sp>
-        <p:nvSpPr>
-          <p:cNvPr id="2" name="PlaceHolder 3"/>
           <p:cNvSpPr>
             <a:spLocks noGrp="1"/>
           </p:cNvSpPr>
@@ -3091,9 +3056,9 @@
               <a:buChar char=""/>
             </a:pPr>
             <a:r>
-              <a:rPr b="0" lang="en-US" sz="1400" spc="-1" strike="noStrike">
-                <a:solidFill>
-                  <a:srgbClr val="000000"/>
+              <a:rPr b="0" lang="en-US" sz="3200" spc="-1" strike="noStrike">
+                <a:solidFill>
+                  <a:srgbClr val="ffffff"/>
                 </a:solidFill>
                 <a:uFill>
                   <a:solidFill>
@@ -3104,9 +3069,9 @@
               </a:rPr>
               <a:t>Click to edit the outline text format</a:t>
             </a:r>
-            <a:endParaRPr b="0" lang="en-US" sz="1400" spc="-1" strike="noStrike">
-              <a:solidFill>
-                <a:srgbClr val="000000"/>
+            <a:endParaRPr b="0" lang="en-US" sz="3200" spc="-1" strike="noStrike">
+              <a:solidFill>
+                <a:srgbClr val="ffffff"/>
               </a:solidFill>
               <a:uFill>
                 <a:solidFill>
@@ -3126,9 +3091,9 @@
               <a:buChar char=""/>
             </a:pPr>
             <a:r>
-              <a:rPr b="0" lang="en-US" sz="1400" spc="-1" strike="noStrike">
-                <a:solidFill>
-                  <a:srgbClr val="000000"/>
+              <a:rPr b="0" lang="en-US" sz="2800" spc="-1" strike="noStrike">
+                <a:solidFill>
+                  <a:srgbClr val="ffffff"/>
                 </a:solidFill>
                 <a:uFill>
                   <a:solidFill>
@@ -3139,9 +3104,9 @@
               </a:rPr>
               <a:t>Second Outline Level</a:t>
             </a:r>
-            <a:endParaRPr b="0" lang="en-US" sz="1400" spc="-1" strike="noStrike">
-              <a:solidFill>
-                <a:srgbClr val="000000"/>
+            <a:endParaRPr b="0" lang="en-US" sz="2800" spc="-1" strike="noStrike">
+              <a:solidFill>
+                <a:srgbClr val="ffffff"/>
               </a:solidFill>
               <a:uFill>
                 <a:solidFill>
@@ -3161,9 +3126,9 @@
               <a:buChar char=""/>
             </a:pPr>
             <a:r>
-              <a:rPr b="0" lang="en-US" sz="1400" spc="-1" strike="noStrike">
-                <a:solidFill>
-                  <a:srgbClr val="000000"/>
+              <a:rPr b="0" lang="en-US" sz="2400" spc="-1" strike="noStrike">
+                <a:solidFill>
+                  <a:srgbClr val="ffffff"/>
                 </a:solidFill>
                 <a:uFill>
                   <a:solidFill>
@@ -3174,9 +3139,9 @@
               </a:rPr>
               <a:t>Third Outline Level</a:t>
             </a:r>
-            <a:endParaRPr b="0" lang="en-US" sz="1400" spc="-1" strike="noStrike">
-              <a:solidFill>
-                <a:srgbClr val="000000"/>
+            <a:endParaRPr b="0" lang="en-US" sz="2400" spc="-1" strike="noStrike">
+              <a:solidFill>
+                <a:srgbClr val="ffffff"/>
               </a:solidFill>
               <a:uFill>
                 <a:solidFill>
@@ -3196,9 +3161,9 @@
               <a:buChar char=""/>
             </a:pPr>
             <a:r>
-              <a:rPr b="0" lang="en-US" sz="1400" spc="-1" strike="noStrike">
-                <a:solidFill>
-                  <a:srgbClr val="000000"/>
+              <a:rPr b="0" lang="en-US" sz="2000" spc="-1" strike="noStrike">
+                <a:solidFill>
+                  <a:srgbClr val="ffffff"/>
                 </a:solidFill>
                 <a:uFill>
                   <a:solidFill>
@@ -3209,9 +3174,9 @@
               </a:rPr>
               <a:t>Fourth Outline Level</a:t>
             </a:r>
-            <a:endParaRPr b="0" lang="en-US" sz="1400" spc="-1" strike="noStrike">
-              <a:solidFill>
-                <a:srgbClr val="000000"/>
+            <a:endParaRPr b="0" lang="en-US" sz="2000" spc="-1" strike="noStrike">
+              <a:solidFill>
+                <a:srgbClr val="ffffff"/>
               </a:solidFill>
               <a:uFill>
                 <a:solidFill>
@@ -3233,7 +3198,7 @@
             <a:r>
               <a:rPr b="0" lang="en-US" sz="2000" spc="-1" strike="noStrike">
                 <a:solidFill>
-                  <a:srgbClr val="000000"/>
+                  <a:srgbClr val="ffffff"/>
                 </a:solidFill>
                 <a:uFill>
                   <a:solidFill>
@@ -3246,7 +3211,7 @@
             </a:r>
             <a:endParaRPr b="0" lang="en-US" sz="2000" spc="-1" strike="noStrike">
               <a:solidFill>
-                <a:srgbClr val="000000"/>
+                <a:srgbClr val="ffffff"/>
               </a:solidFill>
               <a:uFill>
                 <a:solidFill>
@@ -3268,7 +3233,7 @@
             <a:r>
               <a:rPr b="0" lang="en-US" sz="2000" spc="-1" strike="noStrike">
                 <a:solidFill>
-                  <a:srgbClr val="000000"/>
+                  <a:srgbClr val="ffffff"/>
                 </a:solidFill>
                 <a:uFill>
                   <a:solidFill>
@@ -3281,7 +3246,7 @@
             </a:r>
             <a:endParaRPr b="0" lang="en-US" sz="2000" spc="-1" strike="noStrike">
               <a:solidFill>
-                <a:srgbClr val="000000"/>
+                <a:srgbClr val="ffffff"/>
               </a:solidFill>
               <a:uFill>
                 <a:solidFill>
@@ -3303,7 +3268,7 @@
             <a:r>
               <a:rPr b="0" lang="en-US" sz="2000" spc="-1" strike="noStrike">
                 <a:solidFill>
-                  <a:srgbClr val="000000"/>
+                  <a:srgbClr val="ffffff"/>
                 </a:solidFill>
                 <a:uFill>
                   <a:solidFill>
@@ -3316,7 +3281,7 @@
             </a:r>
             <a:endParaRPr b="0" lang="en-US" sz="2000" spc="-1" strike="noStrike">
               <a:solidFill>
-                <a:srgbClr val="000000"/>
+                <a:srgbClr val="ffffff"/>
               </a:solidFill>
               <a:uFill>
                 <a:solidFill>
@@ -3374,7 +3339,7 @@
       </p:grpSpPr>
       <p:sp>
         <p:nvSpPr>
-          <p:cNvPr id="37" name="PlaceHolder 1"/>
+          <p:cNvPr id="36" name="PlaceHolder 1"/>
           <p:cNvSpPr>
             <a:spLocks noGrp="1"/>
           </p:cNvSpPr>
@@ -3385,32 +3350,33 @@
         <p:spPr>
           <a:xfrm>
             <a:off x="311760" y="444960"/>
-            <a:ext cx="8520120" cy="572400"/>
-          </a:xfrm>
-          <a:prstGeom prst="rect">
-            <a:avLst/>
-          </a:prstGeom>
-        </p:spPr>
-        <p:txBody>
-          <a:bodyPr tIns="91440" bIns="91440"/>
-          <a:p>
-            <a:endParaRPr b="0" lang="en-US" sz="1400" spc="-1" strike="noStrike">
-              <a:solidFill>
-                <a:srgbClr val="000000"/>
-              </a:solidFill>
-              <a:uFill>
-                <a:solidFill>
-                  <a:srgbClr val="ffffff"/>
-                </a:solidFill>
-              </a:uFill>
-              <a:latin typeface="Arial"/>
-            </a:endParaRPr>
-          </a:p>
-        </p:txBody>
-      </p:sp>
-      <p:sp>
-        <p:nvSpPr>
-          <p:cNvPr id="38" name="PlaceHolder 2"/>
+            <a:ext cx="8519760" cy="572040"/>
+          </a:xfrm>
+          <a:prstGeom prst="rect">
+            <a:avLst/>
+          </a:prstGeom>
+        </p:spPr>
+        <p:txBody>
+          <a:bodyPr lIns="0" rIns="0" tIns="0" bIns="0" anchor="ctr"/>
+          <a:p>
+            <a:pPr algn="ctr"/>
+            <a:endParaRPr b="0" lang="en-US" sz="4400" spc="-1" strike="noStrike">
+              <a:solidFill>
+                <a:srgbClr val="ffffff"/>
+              </a:solidFill>
+              <a:uFill>
+                <a:solidFill>
+                  <a:srgbClr val="ffffff"/>
+                </a:solidFill>
+              </a:uFill>
+              <a:latin typeface="Arial"/>
+            </a:endParaRPr>
+          </a:p>
+        </p:txBody>
+      </p:sp>
+      <p:sp>
+        <p:nvSpPr>
+          <p:cNvPr id="37" name="PlaceHolder 2"/>
           <p:cNvSpPr>
             <a:spLocks noGrp="1"/>
           </p:cNvSpPr>
@@ -3421,14 +3387,14 @@
         <p:spPr>
           <a:xfrm>
             <a:off x="311760" y="1152360"/>
-            <a:ext cx="8520120" cy="3416040"/>
-          </a:xfrm>
-          <a:prstGeom prst="rect">
-            <a:avLst/>
-          </a:prstGeom>
-        </p:spPr>
-        <p:txBody>
-          <a:bodyPr tIns="91440" bIns="91440"/>
+            <a:ext cx="8519760" cy="3415680"/>
+          </a:xfrm>
+          <a:prstGeom prst="rect">
+            <a:avLst/>
+          </a:prstGeom>
+        </p:spPr>
+        <p:txBody>
+          <a:bodyPr lIns="0" rIns="0" tIns="0" bIns="0"/>
           <a:p>
             <a:pPr marL="432000" indent="-324000">
               <a:buClr>
@@ -3441,7 +3407,7 @@
             <a:r>
               <a:rPr b="0" lang="en-US" sz="1800" spc="-1" strike="noStrike">
                 <a:solidFill>
-                  <a:srgbClr val="000000"/>
+                  <a:srgbClr val="ffffff"/>
                 </a:solidFill>
                 <a:uFill>
                   <a:solidFill>
@@ -3454,7 +3420,7 @@
             </a:r>
             <a:endParaRPr b="0" lang="en-US" sz="1800" spc="-1" strike="noStrike">
               <a:solidFill>
-                <a:srgbClr val="000000"/>
+                <a:srgbClr val="ffffff"/>
               </a:solidFill>
               <a:uFill>
                 <a:solidFill>
@@ -3476,7 +3442,7 @@
             <a:r>
               <a:rPr b="0" lang="en-US" sz="1800" spc="-1" strike="noStrike">
                 <a:solidFill>
-                  <a:srgbClr val="000000"/>
+                  <a:srgbClr val="ffffff"/>
                 </a:solidFill>
                 <a:uFill>
                   <a:solidFill>
@@ -3489,7 +3455,7 @@
             </a:r>
             <a:endParaRPr b="0" lang="en-US" sz="1800" spc="-1" strike="noStrike">
               <a:solidFill>
-                <a:srgbClr val="000000"/>
+                <a:srgbClr val="ffffff"/>
               </a:solidFill>
               <a:uFill>
                 <a:solidFill>
@@ -3511,7 +3477,7 @@
             <a:r>
               <a:rPr b="0" lang="en-US" sz="1800" spc="-1" strike="noStrike">
                 <a:solidFill>
-                  <a:srgbClr val="000000"/>
+                  <a:srgbClr val="ffffff"/>
                 </a:solidFill>
                 <a:uFill>
                   <a:solidFill>
@@ -3524,7 +3490,7 @@
             </a:r>
             <a:endParaRPr b="0" lang="en-US" sz="1800" spc="-1" strike="noStrike">
               <a:solidFill>
-                <a:srgbClr val="000000"/>
+                <a:srgbClr val="ffffff"/>
               </a:solidFill>
               <a:uFill>
                 <a:solidFill>
@@ -3546,7 +3512,7 @@
             <a:r>
               <a:rPr b="0" lang="en-US" sz="1800" spc="-1" strike="noStrike">
                 <a:solidFill>
-                  <a:srgbClr val="000000"/>
+                  <a:srgbClr val="ffffff"/>
                 </a:solidFill>
                 <a:uFill>
                   <a:solidFill>
@@ -3559,7 +3525,7 @@
             </a:r>
             <a:endParaRPr b="0" lang="en-US" sz="1800" spc="-1" strike="noStrike">
               <a:solidFill>
-                <a:srgbClr val="000000"/>
+                <a:srgbClr val="ffffff"/>
               </a:solidFill>
               <a:uFill>
                 <a:solidFill>
@@ -3581,7 +3547,7 @@
             <a:r>
               <a:rPr b="0" lang="en-US" sz="1800" spc="-1" strike="noStrike">
                 <a:solidFill>
-                  <a:srgbClr val="000000"/>
+                  <a:srgbClr val="ffffff"/>
                 </a:solidFill>
                 <a:uFill>
                   <a:solidFill>
@@ -3594,7 +3560,7 @@
             </a:r>
             <a:endParaRPr b="0" lang="en-US" sz="1800" spc="-1" strike="noStrike">
               <a:solidFill>
-                <a:srgbClr val="000000"/>
+                <a:srgbClr val="ffffff"/>
               </a:solidFill>
               <a:uFill>
                 <a:solidFill>
@@ -3616,7 +3582,7 @@
             <a:r>
               <a:rPr b="0" lang="en-US" sz="1800" spc="-1" strike="noStrike">
                 <a:solidFill>
-                  <a:srgbClr val="000000"/>
+                  <a:srgbClr val="ffffff"/>
                 </a:solidFill>
                 <a:uFill>
                   <a:solidFill>
@@ -3629,7 +3595,7 @@
             </a:r>
             <a:endParaRPr b="0" lang="en-US" sz="1800" spc="-1" strike="noStrike">
               <a:solidFill>
-                <a:srgbClr val="000000"/>
+                <a:srgbClr val="ffffff"/>
               </a:solidFill>
               <a:uFill>
                 <a:solidFill>
@@ -3651,7 +3617,7 @@
             <a:r>
               <a:rPr b="0" lang="en-US" sz="1800" spc="-1" strike="noStrike">
                 <a:solidFill>
-                  <a:srgbClr val="000000"/>
+                  <a:srgbClr val="ffffff"/>
                 </a:solidFill>
                 <a:uFill>
                   <a:solidFill>
@@ -3664,70 +3630,14 @@
             </a:r>
             <a:endParaRPr b="0" lang="en-US" sz="1800" spc="-1" strike="noStrike">
               <a:solidFill>
-                <a:srgbClr val="000000"/>
-              </a:solidFill>
-              <a:uFill>
-                <a:solidFill>
-                  <a:srgbClr val="ffffff"/>
-                </a:solidFill>
-              </a:uFill>
-              <a:latin typeface="Arial"/>
-            </a:endParaRPr>
-          </a:p>
-        </p:txBody>
-      </p:sp>
-      <p:sp>
-        <p:nvSpPr>
-          <p:cNvPr id="39" name="PlaceHolder 3"/>
-          <p:cNvSpPr>
-            <a:spLocks noGrp="1"/>
-          </p:cNvSpPr>
-          <p:nvPr>
-            <p:ph type="sldNum"/>
-          </p:nvPr>
-        </p:nvSpPr>
-        <p:spPr>
-          <a:xfrm>
-            <a:off x="8472600" y="4663080"/>
-            <a:ext cx="548280" cy="393120"/>
-          </a:xfrm>
-          <a:prstGeom prst="rect">
-            <a:avLst/>
-          </a:prstGeom>
-        </p:spPr>
-        <p:txBody>
-          <a:bodyPr tIns="91440" bIns="91440" anchor="ctr"/>
-          <a:p>
-            <a:pPr algn="r">
-              <a:lnSpc>
-                <a:spcPct val="100000"/>
-              </a:lnSpc>
-            </a:pPr>
-            <a:fld id="{FF7B3BA9-1F62-404F-91BA-8335407F51D3}" type="slidenum">
-              <a:rPr b="0" lang="en-US" sz="1000" spc="-1" strike="noStrike">
-                <a:solidFill>
-                  <a:srgbClr val="adadad"/>
-                </a:solidFill>
-                <a:uFill>
-                  <a:solidFill>
-                    <a:srgbClr val="ffffff"/>
-                  </a:solidFill>
-                </a:uFill>
-                <a:latin typeface="Arial"/>
-                <a:ea typeface="Arial"/>
-              </a:rPr>
-              <a:t>&lt;number&gt;</a:t>
-            </a:fld>
-            <a:endParaRPr b="0" lang="en-US" sz="1400" spc="-1" strike="noStrike">
-              <a:solidFill>
-                <a:srgbClr val="ffffff"/>
-              </a:solidFill>
-              <a:uFill>
-                <a:solidFill>
-                  <a:srgbClr val="ffffff"/>
-                </a:solidFill>
-              </a:uFill>
-              <a:latin typeface="Times New Roman"/>
+                <a:srgbClr val="ffffff"/>
+              </a:solidFill>
+              <a:uFill>
+                <a:solidFill>
+                  <a:srgbClr val="ffffff"/>
+                </a:solidFill>
+              </a:uFill>
+              <a:latin typeface="Arial"/>
             </a:endParaRPr>
           </a:p>
         </p:txBody>
@@ -3771,14 +3681,14 @@
       </p:grpSpPr>
       <p:sp>
         <p:nvSpPr>
-          <p:cNvPr id="74" name="TextShape 1"/>
-          <p:cNvSpPr txBox="1"/>
+          <p:cNvPr id="72" name="CustomShape 1"/>
+          <p:cNvSpPr/>
           <p:nvPr/>
         </p:nvSpPr>
         <p:spPr>
           <a:xfrm>
             <a:off x="311760" y="744480"/>
-            <a:ext cx="8520120" cy="2052360"/>
+            <a:ext cx="8519760" cy="2052000"/>
           </a:xfrm>
           <a:prstGeom prst="rect">
             <a:avLst/>
@@ -3788,8 +3698,14 @@
             <a:noFill/>
           </a:ln>
         </p:spPr>
-        <p:txBody>
-          <a:bodyPr tIns="91440" bIns="91440" anchor="b"/>
+        <p:style>
+          <a:lnRef idx="0"/>
+          <a:fillRef idx="0"/>
+          <a:effectRef idx="0"/>
+          <a:fontRef idx="minor"/>
+        </p:style>
+        <p:txBody>
+          <a:bodyPr lIns="90000" rIns="90000" tIns="91440" bIns="91440" anchor="b"/>
           <a:p>
             <a:pPr algn="ctr">
               <a:lnSpc>
@@ -3811,30 +3727,30 @@
               </a:rPr>
               <a:t>Search for Exoplanets</a:t>
             </a:r>
-            <a:endParaRPr b="0" lang="en-US" sz="1400" spc="-1" strike="noStrike">
-              <a:solidFill>
-                <a:srgbClr val="000000"/>
-              </a:solidFill>
-              <a:uFill>
-                <a:solidFill>
-                  <a:srgbClr val="ffffff"/>
-                </a:solidFill>
-              </a:uFill>
-              <a:latin typeface="Arial"/>
-            </a:endParaRPr>
-          </a:p>
-        </p:txBody>
-      </p:sp>
-      <p:sp>
-        <p:nvSpPr>
-          <p:cNvPr id="75" name="TextShape 2"/>
-          <p:cNvSpPr txBox="1"/>
+            <a:endParaRPr b="0" lang="en-US" sz="1800" spc="-1" strike="noStrike">
+              <a:solidFill>
+                <a:srgbClr val="ffffff"/>
+              </a:solidFill>
+              <a:uFill>
+                <a:solidFill>
+                  <a:srgbClr val="ffffff"/>
+                </a:solidFill>
+              </a:uFill>
+              <a:latin typeface="Arial"/>
+            </a:endParaRPr>
+          </a:p>
+        </p:txBody>
+      </p:sp>
+      <p:sp>
+        <p:nvSpPr>
+          <p:cNvPr id="73" name="CustomShape 2"/>
+          <p:cNvSpPr/>
           <p:nvPr/>
         </p:nvSpPr>
         <p:spPr>
           <a:xfrm>
             <a:off x="311760" y="2834280"/>
-            <a:ext cx="8520120" cy="792360"/>
+            <a:ext cx="8519760" cy="792000"/>
           </a:xfrm>
           <a:prstGeom prst="rect">
             <a:avLst/>
@@ -3844,8 +3760,14 @@
             <a:noFill/>
           </a:ln>
         </p:spPr>
-        <p:txBody>
-          <a:bodyPr tIns="91440" bIns="91440"/>
+        <p:style>
+          <a:lnRef idx="0"/>
+          <a:fillRef idx="0"/>
+          <a:effectRef idx="0"/>
+          <a:fontRef idx="minor"/>
+        </p:style>
+        <p:txBody>
+          <a:bodyPr lIns="90000" rIns="90000" tIns="91440" bIns="91440"/>
           <a:p>
             <a:pPr algn="ctr">
               <a:lnSpc>
@@ -3867,7 +3789,7 @@
               </a:rPr>
               <a:t>(project proposal)</a:t>
             </a:r>
-            <a:endParaRPr b="0" lang="en-US" sz="3200" spc="-1" strike="noStrike">
+            <a:endParaRPr b="0" lang="en-US" sz="1800" spc="-1" strike="noStrike">
               <a:solidFill>
                 <a:srgbClr val="ffffff"/>
               </a:solidFill>
@@ -3932,14 +3854,14 @@
       </p:grpSpPr>
       <p:sp>
         <p:nvSpPr>
-          <p:cNvPr id="76" name="TextShape 1"/>
-          <p:cNvSpPr txBox="1"/>
+          <p:cNvPr id="74" name="CustomShape 1"/>
+          <p:cNvSpPr/>
           <p:nvPr/>
         </p:nvSpPr>
         <p:spPr>
           <a:xfrm>
             <a:off x="311760" y="444960"/>
-            <a:ext cx="8520120" cy="572400"/>
+            <a:ext cx="8519760" cy="572040"/>
           </a:xfrm>
           <a:prstGeom prst="rect">
             <a:avLst/>
@@ -3949,8 +3871,14 @@
             <a:noFill/>
           </a:ln>
         </p:spPr>
-        <p:txBody>
-          <a:bodyPr tIns="91440" bIns="91440"/>
+        <p:style>
+          <a:lnRef idx="0"/>
+          <a:fillRef idx="0"/>
+          <a:effectRef idx="0"/>
+          <a:fontRef idx="minor"/>
+        </p:style>
+        <p:txBody>
+          <a:bodyPr lIns="90000" rIns="90000" tIns="91440" bIns="91440"/>
           <a:p>
             <a:pPr>
               <a:lnSpc>
@@ -3972,30 +3900,30 @@
               </a:rPr>
               <a:t>Current State</a:t>
             </a:r>
-            <a:endParaRPr b="0" lang="en-US" sz="1400" spc="-1" strike="noStrike">
-              <a:solidFill>
-                <a:srgbClr val="000000"/>
-              </a:solidFill>
-              <a:uFill>
-                <a:solidFill>
-                  <a:srgbClr val="ffffff"/>
-                </a:solidFill>
-              </a:uFill>
-              <a:latin typeface="Arial"/>
-            </a:endParaRPr>
-          </a:p>
-        </p:txBody>
-      </p:sp>
-      <p:sp>
-        <p:nvSpPr>
-          <p:cNvPr id="77" name="TextShape 2"/>
-          <p:cNvSpPr txBox="1"/>
+            <a:endParaRPr b="0" lang="en-US" sz="1800" spc="-1" strike="noStrike">
+              <a:solidFill>
+                <a:srgbClr val="ffffff"/>
+              </a:solidFill>
+              <a:uFill>
+                <a:solidFill>
+                  <a:srgbClr val="ffffff"/>
+                </a:solidFill>
+              </a:uFill>
+              <a:latin typeface="Arial"/>
+            </a:endParaRPr>
+          </a:p>
+        </p:txBody>
+      </p:sp>
+      <p:sp>
+        <p:nvSpPr>
+          <p:cNvPr id="75" name="CustomShape 2"/>
+          <p:cNvSpPr/>
           <p:nvPr/>
         </p:nvSpPr>
         <p:spPr>
           <a:xfrm>
             <a:off x="916200" y="4172040"/>
-            <a:ext cx="2952720" cy="798840"/>
+            <a:ext cx="2952360" cy="798480"/>
           </a:xfrm>
           <a:prstGeom prst="rect">
             <a:avLst/>
@@ -4005,8 +3933,14 @@
             <a:noFill/>
           </a:ln>
         </p:spPr>
-        <p:txBody>
-          <a:bodyPr tIns="91440" bIns="91440"/>
+        <p:style>
+          <a:lnRef idx="0"/>
+          <a:fillRef idx="0"/>
+          <a:effectRef idx="0"/>
+          <a:fontRef idx="minor"/>
+        </p:style>
+        <p:txBody>
+          <a:bodyPr lIns="90000" rIns="90000" tIns="91440" bIns="91440"/>
           <a:p>
             <a:pPr>
               <a:lnSpc>
@@ -4028,9 +3962,9 @@
               </a:rPr>
               <a:t>Kepler space observatory (launched in 2009)</a:t>
             </a:r>
-            <a:endParaRPr b="0" lang="en-US" sz="1400" spc="-1" strike="noStrike">
-              <a:solidFill>
-                <a:srgbClr val="000000"/>
+            <a:endParaRPr b="0" lang="en-US" sz="1800" spc="-1" strike="noStrike">
+              <a:solidFill>
+                <a:srgbClr val="ffffff"/>
               </a:solidFill>
               <a:uFill>
                 <a:solidFill>
@@ -4044,7 +3978,7 @@
       </p:sp>
       <p:pic>
         <p:nvPicPr>
-          <p:cNvPr id="78" name="Shape 62" descr=""/>
+          <p:cNvPr id="76" name="Shape 62" descr=""/>
           <p:cNvPicPr/>
           <p:nvPr/>
         </p:nvPicPr>
@@ -4055,7 +3989,7 @@
         <p:spPr>
           <a:xfrm>
             <a:off x="502560" y="1656720"/>
-            <a:ext cx="3518280" cy="2404080"/>
+            <a:ext cx="3517920" cy="2403720"/>
           </a:xfrm>
           <a:prstGeom prst="rect">
             <a:avLst/>
@@ -4067,7 +4001,7 @@
       </p:pic>
       <p:pic>
         <p:nvPicPr>
-          <p:cNvPr id="79" name="Shape 63" descr=""/>
+          <p:cNvPr id="77" name="Shape 63" descr=""/>
           <p:cNvPicPr/>
           <p:nvPr/>
         </p:nvPicPr>
@@ -4078,7 +4012,7 @@
         <p:spPr>
           <a:xfrm>
             <a:off x="6604560" y="159840"/>
-            <a:ext cx="2381040" cy="1685520"/>
+            <a:ext cx="2380680" cy="1685160"/>
           </a:xfrm>
           <a:prstGeom prst="rect">
             <a:avLst/>
@@ -4090,14 +4024,14 @@
       </p:pic>
       <p:sp>
         <p:nvSpPr>
-          <p:cNvPr id="80" name="TextShape 3"/>
-          <p:cNvSpPr txBox="1"/>
+          <p:cNvPr id="78" name="CustomShape 3"/>
+          <p:cNvSpPr/>
           <p:nvPr/>
         </p:nvSpPr>
         <p:spPr>
           <a:xfrm>
             <a:off x="4296600" y="218520"/>
-            <a:ext cx="2801160" cy="1135800"/>
+            <a:ext cx="2800800" cy="1135440"/>
           </a:xfrm>
           <a:prstGeom prst="rect">
             <a:avLst/>
@@ -4107,8 +4041,14 @@
             <a:noFill/>
           </a:ln>
         </p:spPr>
-        <p:txBody>
-          <a:bodyPr tIns="91440" bIns="91440"/>
+        <p:style>
+          <a:lnRef idx="0"/>
+          <a:fillRef idx="0"/>
+          <a:effectRef idx="0"/>
+          <a:fontRef idx="minor"/>
+        </p:style>
+        <p:txBody>
+          <a:bodyPr lIns="90000" rIns="90000" tIns="91440" bIns="91440"/>
           <a:p>
             <a:pPr>
               <a:lnSpc>
@@ -4130,30 +4070,30 @@
               </a:rPr>
               <a:t>Transiting Exoplanet Survey Satellite  (launched in April, 2018)</a:t>
             </a:r>
-            <a:endParaRPr b="0" lang="en-US" sz="1400" spc="-1" strike="noStrike">
-              <a:solidFill>
-                <a:srgbClr val="000000"/>
-              </a:solidFill>
-              <a:uFill>
-                <a:solidFill>
-                  <a:srgbClr val="ffffff"/>
-                </a:solidFill>
-              </a:uFill>
-              <a:latin typeface="Arial"/>
-            </a:endParaRPr>
-          </a:p>
-        </p:txBody>
-      </p:sp>
-      <p:sp>
-        <p:nvSpPr>
-          <p:cNvPr id="81" name="TextShape 4"/>
-          <p:cNvSpPr txBox="1"/>
+            <a:endParaRPr b="0" lang="en-US" sz="1800" spc="-1" strike="noStrike">
+              <a:solidFill>
+                <a:srgbClr val="ffffff"/>
+              </a:solidFill>
+              <a:uFill>
+                <a:solidFill>
+                  <a:srgbClr val="ffffff"/>
+                </a:solidFill>
+              </a:uFill>
+              <a:latin typeface="Arial"/>
+            </a:endParaRPr>
+          </a:p>
+        </p:txBody>
+      </p:sp>
+      <p:sp>
+        <p:nvSpPr>
+          <p:cNvPr id="79" name="CustomShape 4"/>
+          <p:cNvSpPr/>
           <p:nvPr/>
         </p:nvSpPr>
         <p:spPr>
           <a:xfrm>
             <a:off x="4572000" y="2521800"/>
-            <a:ext cx="4259880" cy="2322720"/>
+            <a:ext cx="4259520" cy="2322360"/>
           </a:xfrm>
           <a:prstGeom prst="rect">
             <a:avLst/>
@@ -4163,10 +4103,16 @@
             <a:noFill/>
           </a:ln>
         </p:spPr>
-        <p:txBody>
-          <a:bodyPr tIns="91440" bIns="91440"/>
-          <a:p>
-            <a:pPr marL="457200" indent="-342720">
+        <p:style>
+          <a:lnRef idx="0"/>
+          <a:fillRef idx="0"/>
+          <a:effectRef idx="0"/>
+          <a:fontRef idx="minor"/>
+        </p:style>
+        <p:txBody>
+          <a:bodyPr lIns="90000" rIns="90000" tIns="91440" bIns="91440"/>
+          <a:p>
+            <a:pPr marL="457200" indent="-342360">
               <a:lnSpc>
                 <a:spcPct val="100000"/>
               </a:lnSpc>
@@ -4191,20 +4137,20 @@
               </a:rPr>
               <a:t>3,758 confirmed exoplanets in 2,808 systems, with 627 systems having more than one planet.</a:t>
             </a:r>
-            <a:endParaRPr b="0" lang="en-US" sz="1400" spc="-1" strike="noStrike">
-              <a:solidFill>
-                <a:srgbClr val="000000"/>
-              </a:solidFill>
-              <a:uFill>
-                <a:solidFill>
-                  <a:srgbClr val="ffffff"/>
-                </a:solidFill>
-              </a:uFill>
-              <a:latin typeface="Arial"/>
-            </a:endParaRPr>
-          </a:p>
-          <a:p>
-            <a:pPr marL="457200" indent="-342720">
+            <a:endParaRPr b="0" lang="en-US" sz="1800" spc="-1" strike="noStrike">
+              <a:solidFill>
+                <a:srgbClr val="ffffff"/>
+              </a:solidFill>
+              <a:uFill>
+                <a:solidFill>
+                  <a:srgbClr val="ffffff"/>
+                </a:solidFill>
+              </a:uFill>
+              <a:latin typeface="Arial"/>
+            </a:endParaRPr>
+          </a:p>
+          <a:p>
+            <a:pPr marL="457200" indent="-342360">
               <a:lnSpc>
                 <a:spcPct val="100000"/>
               </a:lnSpc>
@@ -4229,9 +4175,9 @@
               </a:rPr>
               <a:t>expecting 20,000 new exoplanets in the next 2 years</a:t>
             </a:r>
-            <a:endParaRPr b="0" lang="en-US" sz="1400" spc="-1" strike="noStrike">
-              <a:solidFill>
-                <a:srgbClr val="000000"/>
+            <a:endParaRPr b="0" lang="en-US" sz="1800" spc="-1" strike="noStrike">
+              <a:solidFill>
+                <a:srgbClr val="ffffff"/>
               </a:solidFill>
               <a:uFill>
                 <a:solidFill>
@@ -4294,14 +4240,14 @@
       </p:grpSpPr>
       <p:sp>
         <p:nvSpPr>
-          <p:cNvPr id="82" name="TextShape 1"/>
-          <p:cNvSpPr txBox="1"/>
+          <p:cNvPr id="80" name="CustomShape 1"/>
+          <p:cNvSpPr/>
           <p:nvPr/>
         </p:nvSpPr>
         <p:spPr>
           <a:xfrm>
             <a:off x="311760" y="444960"/>
-            <a:ext cx="8520120" cy="572400"/>
+            <a:ext cx="8519760" cy="572040"/>
           </a:xfrm>
           <a:prstGeom prst="rect">
             <a:avLst/>
@@ -4311,8 +4257,14 @@
             <a:noFill/>
           </a:ln>
         </p:spPr>
-        <p:txBody>
-          <a:bodyPr tIns="91440" bIns="91440"/>
+        <p:style>
+          <a:lnRef idx="0"/>
+          <a:fillRef idx="0"/>
+          <a:effectRef idx="0"/>
+          <a:fontRef idx="minor"/>
+        </p:style>
+        <p:txBody>
+          <a:bodyPr lIns="90000" rIns="90000" tIns="91440" bIns="91440"/>
           <a:p>
             <a:pPr>
               <a:lnSpc>
@@ -4334,30 +4286,30 @@
               </a:rPr>
               <a:t>Methods</a:t>
             </a:r>
-            <a:endParaRPr b="0" lang="en-US" sz="1400" spc="-1" strike="noStrike">
-              <a:solidFill>
-                <a:srgbClr val="000000"/>
-              </a:solidFill>
-              <a:uFill>
-                <a:solidFill>
-                  <a:srgbClr val="ffffff"/>
-                </a:solidFill>
-              </a:uFill>
-              <a:latin typeface="Arial"/>
-            </a:endParaRPr>
-          </a:p>
-        </p:txBody>
-      </p:sp>
-      <p:sp>
-        <p:nvSpPr>
-          <p:cNvPr id="83" name="TextShape 2"/>
-          <p:cNvSpPr txBox="1"/>
+            <a:endParaRPr b="0" lang="en-US" sz="1800" spc="-1" strike="noStrike">
+              <a:solidFill>
+                <a:srgbClr val="ffffff"/>
+              </a:solidFill>
+              <a:uFill>
+                <a:solidFill>
+                  <a:srgbClr val="ffffff"/>
+                </a:solidFill>
+              </a:uFill>
+              <a:latin typeface="Arial"/>
+            </a:endParaRPr>
+          </a:p>
+        </p:txBody>
+      </p:sp>
+      <p:sp>
+        <p:nvSpPr>
+          <p:cNvPr id="81" name="CustomShape 2"/>
+          <p:cNvSpPr/>
           <p:nvPr/>
         </p:nvSpPr>
         <p:spPr>
           <a:xfrm>
             <a:off x="1074600" y="3895200"/>
-            <a:ext cx="1674360" cy="431640"/>
+            <a:ext cx="1674000" cy="431280"/>
           </a:xfrm>
           <a:prstGeom prst="rect">
             <a:avLst/>
@@ -4367,8 +4319,14 @@
             <a:noFill/>
           </a:ln>
         </p:spPr>
-        <p:txBody>
-          <a:bodyPr tIns="91440" bIns="91440"/>
+        <p:style>
+          <a:lnRef idx="0"/>
+          <a:fillRef idx="0"/>
+          <a:effectRef idx="0"/>
+          <a:fontRef idx="minor"/>
+        </p:style>
+        <p:txBody>
+          <a:bodyPr lIns="90000" rIns="90000" tIns="91440" bIns="91440"/>
           <a:p>
             <a:pPr>
               <a:lnSpc>
@@ -4390,9 +4348,9 @@
               </a:rPr>
               <a:t>Radial velocity</a:t>
             </a:r>
-            <a:endParaRPr b="0" lang="en-US" sz="1400" spc="-1" strike="noStrike">
-              <a:solidFill>
-                <a:srgbClr val="000000"/>
+            <a:endParaRPr b="0" lang="en-US" sz="1800" spc="-1" strike="noStrike">
+              <a:solidFill>
+                <a:srgbClr val="ffffff"/>
               </a:solidFill>
               <a:uFill>
                 <a:solidFill>
@@ -4406,7 +4364,7 @@
       </p:sp>
       <p:pic>
         <p:nvPicPr>
-          <p:cNvPr id="84" name="Shape 72" descr=""/>
+          <p:cNvPr id="82" name="Shape 72" descr=""/>
           <p:cNvPicPr/>
           <p:nvPr/>
         </p:nvPicPr>
@@ -4417,7 +4375,7 @@
         <p:spPr>
           <a:xfrm>
             <a:off x="241200" y="1469520"/>
-            <a:ext cx="3341520" cy="2376360"/>
+            <a:ext cx="3341160" cy="2376000"/>
           </a:xfrm>
           <a:prstGeom prst="rect">
             <a:avLst/>
@@ -4429,14 +4387,14 @@
       </p:pic>
       <p:sp>
         <p:nvSpPr>
-          <p:cNvPr id="85" name="TextShape 3"/>
-          <p:cNvSpPr txBox="1"/>
+          <p:cNvPr id="83" name="CustomShape 3"/>
+          <p:cNvSpPr/>
           <p:nvPr/>
         </p:nvSpPr>
         <p:spPr>
           <a:xfrm>
             <a:off x="6750360" y="3774600"/>
-            <a:ext cx="1789920" cy="1019520"/>
+            <a:ext cx="1789560" cy="1019160"/>
           </a:xfrm>
           <a:prstGeom prst="rect">
             <a:avLst/>
@@ -4446,8 +4404,14 @@
             <a:noFill/>
           </a:ln>
         </p:spPr>
-        <p:txBody>
-          <a:bodyPr tIns="91440" bIns="91440"/>
+        <p:style>
+          <a:lnRef idx="0"/>
+          <a:fillRef idx="0"/>
+          <a:effectRef idx="0"/>
+          <a:fontRef idx="minor"/>
+        </p:style>
+        <p:txBody>
+          <a:bodyPr lIns="90000" rIns="90000" tIns="91440" bIns="91440"/>
           <a:p>
             <a:pPr>
               <a:lnSpc>
@@ -4469,9 +4433,9 @@
               </a:rPr>
               <a:t>Gravitational microlensing</a:t>
             </a:r>
-            <a:endParaRPr b="0" lang="en-US" sz="1400" spc="-1" strike="noStrike">
-              <a:solidFill>
-                <a:srgbClr val="000000"/>
+            <a:endParaRPr b="0" lang="en-US" sz="1800" spc="-1" strike="noStrike">
+              <a:solidFill>
+                <a:srgbClr val="ffffff"/>
               </a:solidFill>
               <a:uFill>
                 <a:solidFill>
@@ -4485,7 +4449,7 @@
       </p:sp>
       <p:pic>
         <p:nvPicPr>
-          <p:cNvPr id="86" name="Shape 74" descr=""/>
+          <p:cNvPr id="84" name="Shape 74" descr=""/>
           <p:cNvPicPr/>
           <p:nvPr/>
         </p:nvPicPr>
@@ -4496,7 +4460,7 @@
         <p:spPr>
           <a:xfrm>
             <a:off x="3738600" y="3612600"/>
-            <a:ext cx="2856240" cy="1343880"/>
+            <a:ext cx="2855880" cy="1343520"/>
           </a:xfrm>
           <a:prstGeom prst="rect">
             <a:avLst/>
@@ -4508,7 +4472,7 @@
       </p:pic>
       <p:pic>
         <p:nvPicPr>
-          <p:cNvPr id="87" name="Shape 75" descr=""/>
+          <p:cNvPr id="85" name="Shape 75" descr=""/>
           <p:cNvPicPr/>
           <p:nvPr/>
         </p:nvPicPr>
@@ -4519,7 +4483,7 @@
         <p:spPr>
           <a:xfrm>
             <a:off x="4326480" y="172080"/>
-            <a:ext cx="4393080" cy="3294720"/>
+            <a:ext cx="4392720" cy="3294360"/>
           </a:xfrm>
           <a:prstGeom prst="rect">
             <a:avLst/>
@@ -4531,14 +4495,14 @@
       </p:pic>
       <p:sp>
         <p:nvSpPr>
-          <p:cNvPr id="88" name="TextShape 4"/>
-          <p:cNvSpPr txBox="1"/>
+          <p:cNvPr id="86" name="CustomShape 4"/>
+          <p:cNvSpPr/>
           <p:nvPr/>
         </p:nvSpPr>
         <p:spPr>
           <a:xfrm>
             <a:off x="5527080" y="2956680"/>
-            <a:ext cx="2141640" cy="431640"/>
+            <a:ext cx="2141280" cy="431280"/>
           </a:xfrm>
           <a:prstGeom prst="rect">
             <a:avLst/>
@@ -4548,8 +4512,14 @@
             <a:noFill/>
           </a:ln>
         </p:spPr>
-        <p:txBody>
-          <a:bodyPr tIns="91440" bIns="91440"/>
+        <p:style>
+          <a:lnRef idx="0"/>
+          <a:fillRef idx="0"/>
+          <a:effectRef idx="0"/>
+          <a:fontRef idx="minor"/>
+        </p:style>
+        <p:txBody>
+          <a:bodyPr lIns="90000" rIns="90000" tIns="91440" bIns="91440"/>
           <a:p>
             <a:pPr>
               <a:lnSpc>
@@ -4571,9 +4541,9 @@
               </a:rPr>
               <a:t>Transit photometry</a:t>
             </a:r>
-            <a:endParaRPr b="0" lang="en-US" sz="1400" spc="-1" strike="noStrike">
-              <a:solidFill>
-                <a:srgbClr val="000000"/>
+            <a:endParaRPr b="0" lang="en-US" sz="1800" spc="-1" strike="noStrike">
+              <a:solidFill>
+                <a:srgbClr val="ffffff"/>
               </a:solidFill>
               <a:uFill>
                 <a:solidFill>
@@ -4636,14 +4606,14 @@
       </p:grpSpPr>
       <p:sp>
         <p:nvSpPr>
-          <p:cNvPr id="89" name="TextShape 1"/>
-          <p:cNvSpPr txBox="1"/>
+          <p:cNvPr id="87" name="CustomShape 1"/>
+          <p:cNvSpPr/>
           <p:nvPr/>
         </p:nvSpPr>
         <p:spPr>
           <a:xfrm>
             <a:off x="311760" y="433440"/>
-            <a:ext cx="8520120" cy="572400"/>
+            <a:ext cx="8519760" cy="572040"/>
           </a:xfrm>
           <a:prstGeom prst="rect">
             <a:avLst/>
@@ -4653,8 +4623,14 @@
             <a:noFill/>
           </a:ln>
         </p:spPr>
-        <p:txBody>
-          <a:bodyPr tIns="91440" bIns="91440"/>
+        <p:style>
+          <a:lnRef idx="0"/>
+          <a:fillRef idx="0"/>
+          <a:effectRef idx="0"/>
+          <a:fontRef idx="minor"/>
+        </p:style>
+        <p:txBody>
+          <a:bodyPr lIns="90000" rIns="90000" tIns="91440" bIns="91440"/>
           <a:p>
             <a:pPr>
               <a:lnSpc>
@@ -4676,9 +4652,9 @@
               </a:rPr>
               <a:t>Model</a:t>
             </a:r>
-            <a:endParaRPr b="0" lang="en-US" sz="1400" spc="-1" strike="noStrike">
-              <a:solidFill>
-                <a:srgbClr val="000000"/>
+            <a:endParaRPr b="0" lang="en-US" sz="1800" spc="-1" strike="noStrike">
+              <a:solidFill>
+                <a:srgbClr val="ffffff"/>
               </a:solidFill>
               <a:uFill>
                 <a:solidFill>
@@ -4692,7 +4668,7 @@
       </p:sp>
       <p:pic>
         <p:nvPicPr>
-          <p:cNvPr id="90" name="Shape 82" descr=""/>
+          <p:cNvPr id="88" name="Shape 82" descr=""/>
           <p:cNvPicPr/>
           <p:nvPr/>
         </p:nvPicPr>
@@ -4702,8 +4678,8 @@
         </p:blipFill>
         <p:spPr>
           <a:xfrm>
-            <a:off x="1848600" y="923400"/>
-            <a:ext cx="2812320" cy="1124640"/>
+            <a:off x="1737360" y="433440"/>
+            <a:ext cx="2811960" cy="1124280"/>
           </a:xfrm>
           <a:prstGeom prst="rect">
             <a:avLst/>
@@ -4715,7 +4691,7 @@
       </p:pic>
       <p:pic>
         <p:nvPicPr>
-          <p:cNvPr id="91" name="Shape 83" descr=""/>
+          <p:cNvPr id="89" name="Shape 83" descr=""/>
           <p:cNvPicPr/>
           <p:nvPr/>
         </p:nvPicPr>
@@ -4726,7 +4702,7 @@
         <p:spPr>
           <a:xfrm>
             <a:off x="2720880" y="1688760"/>
-            <a:ext cx="6070680" cy="3282480"/>
+            <a:ext cx="6070320" cy="3282120"/>
           </a:xfrm>
           <a:prstGeom prst="rect">
             <a:avLst/>
@@ -4738,14 +4714,14 @@
       </p:pic>
       <p:sp>
         <p:nvSpPr>
-          <p:cNvPr id="92" name="CustomShape 2"/>
+          <p:cNvPr id="90" name="CustomShape 2"/>
           <p:cNvSpPr/>
           <p:nvPr/>
         </p:nvSpPr>
         <p:spPr>
           <a:xfrm rot="10800000">
-            <a:off x="1618920" y="2502720"/>
-            <a:ext cx="837720" cy="1124640"/>
+            <a:off x="1568880" y="2404440"/>
+            <a:ext cx="837360" cy="1124280"/>
           </a:xfrm>
           <a:prstGeom prst="bentUpArrow">
             <a:avLst>
@@ -4773,14 +4749,14 @@
       </p:sp>
       <p:sp>
         <p:nvSpPr>
-          <p:cNvPr id="93" name="CustomShape 3"/>
+          <p:cNvPr id="91" name="CustomShape 3"/>
           <p:cNvSpPr/>
           <p:nvPr/>
         </p:nvSpPr>
         <p:spPr>
           <a:xfrm>
             <a:off x="367560" y="2634480"/>
-            <a:ext cx="1159200" cy="1164960"/>
+            <a:ext cx="1158840" cy="1164600"/>
           </a:xfrm>
           <a:prstGeom prst="rect">
             <a:avLst/>
@@ -4804,14 +4780,14 @@
       </p:sp>
       <p:sp>
         <p:nvSpPr>
-          <p:cNvPr id="94" name="CustomShape 4"/>
+          <p:cNvPr id="92" name="CustomShape 4"/>
           <p:cNvSpPr/>
           <p:nvPr/>
         </p:nvSpPr>
         <p:spPr>
           <a:xfrm>
             <a:off x="1676160" y="2985840"/>
-            <a:ext cx="895320" cy="447480"/>
+            <a:ext cx="894960" cy="447120"/>
           </a:xfrm>
           <a:prstGeom prst="rightArrow">
             <a:avLst>
@@ -4838,7 +4814,7 @@
       </p:sp>
       <p:pic>
         <p:nvPicPr>
-          <p:cNvPr id="95" name="Shape 87" descr=""/>
+          <p:cNvPr id="93" name="Shape 87" descr=""/>
           <p:cNvPicPr/>
           <p:nvPr/>
         </p:nvPicPr>
@@ -4849,7 +4825,7 @@
         <p:spPr>
           <a:xfrm>
             <a:off x="7164000" y="2455920"/>
-            <a:ext cx="837720" cy="628200"/>
+            <a:ext cx="837360" cy="627840"/>
           </a:xfrm>
           <a:prstGeom prst="rect">
             <a:avLst/>
@@ -4861,7 +4837,7 @@
       </p:pic>
       <p:pic>
         <p:nvPicPr>
-          <p:cNvPr id="96" name="Shape 88" descr=""/>
+          <p:cNvPr id="94" name="Shape 88" descr=""/>
           <p:cNvPicPr/>
           <p:nvPr/>
         </p:nvPicPr>
@@ -4872,7 +4848,7 @@
         <p:spPr>
           <a:xfrm>
             <a:off x="7164000" y="3141720"/>
-            <a:ext cx="837720" cy="628200"/>
+            <a:ext cx="837360" cy="627840"/>
           </a:xfrm>
           <a:prstGeom prst="rect">
             <a:avLst/>
@@ -4884,14 +4860,14 @@
       </p:pic>
       <p:sp>
         <p:nvSpPr>
-          <p:cNvPr id="97" name="CustomShape 5"/>
+          <p:cNvPr id="95" name="CustomShape 5"/>
           <p:cNvSpPr/>
           <p:nvPr/>
         </p:nvSpPr>
         <p:spPr>
           <a:xfrm>
             <a:off x="7182720" y="3171240"/>
-            <a:ext cx="837720" cy="628200"/>
+            <a:ext cx="837360" cy="627840"/>
           </a:xfrm>
           <a:prstGeom prst="mathMultiply">
             <a:avLst>
@@ -4917,14 +4893,14 @@
       </p:sp>
       <p:sp>
         <p:nvSpPr>
-          <p:cNvPr id="98" name="TextShape 6"/>
-          <p:cNvSpPr txBox="1"/>
+          <p:cNvPr id="96" name="CustomShape 6"/>
+          <p:cNvSpPr/>
           <p:nvPr/>
         </p:nvSpPr>
         <p:spPr>
           <a:xfrm>
             <a:off x="4737240" y="864360"/>
-            <a:ext cx="2426760" cy="431640"/>
+            <a:ext cx="2426400" cy="431280"/>
           </a:xfrm>
           <a:prstGeom prst="rect">
             <a:avLst/>
@@ -4934,8 +4910,14 @@
             <a:noFill/>
           </a:ln>
         </p:spPr>
-        <p:txBody>
-          <a:bodyPr tIns="91440" bIns="91440"/>
+        <p:style>
+          <a:lnRef idx="0"/>
+          <a:fillRef idx="0"/>
+          <a:effectRef idx="0"/>
+          <a:fontRef idx="minor"/>
+        </p:style>
+        <p:txBody>
+          <a:bodyPr lIns="90000" rIns="90000" tIns="91440" bIns="91440"/>
           <a:p>
             <a:pPr>
               <a:lnSpc>
@@ -4957,9 +4939,9 @@
               </a:rPr>
               <a:t>raw light-curve data</a:t>
             </a:r>
-            <a:endParaRPr b="0" lang="en-US" sz="1400" spc="-1" strike="noStrike">
-              <a:solidFill>
-                <a:srgbClr val="000000"/>
+            <a:endParaRPr b="0" lang="en-US" sz="1800" spc="-1" strike="noStrike">
+              <a:solidFill>
+                <a:srgbClr val="ffffff"/>
               </a:solidFill>
               <a:uFill>
                 <a:solidFill>
@@ -4973,7 +4955,7 @@
       </p:sp>
       <p:pic>
         <p:nvPicPr>
-          <p:cNvPr id="99" name="Shape 91" descr=""/>
+          <p:cNvPr id="97" name="Shape 91" descr=""/>
           <p:cNvPicPr/>
           <p:nvPr/>
         </p:nvPicPr>
@@ -4984,7 +4966,7 @@
         <p:spPr>
           <a:xfrm>
             <a:off x="429480" y="2736000"/>
-            <a:ext cx="1035360" cy="1035360"/>
+            <a:ext cx="1035000" cy="1035000"/>
           </a:xfrm>
           <a:prstGeom prst="rect">
             <a:avLst/>

</xml_diff>